<commit_message>
added more messages in enum
</commit_message>
<xml_diff>
--- a/resources/figs/RAPID integration.pptx
+++ b/resources/figs/RAPID integration.pptx
@@ -5,7 +5,7 @@
     <p:sldMasterId id="2147483659" r:id="rId1"/>
   </p:sldMasterIdLst>
   <p:notesMasterIdLst>
-    <p:notesMasterId r:id="rId59"/>
+    <p:notesMasterId r:id="rId63"/>
   </p:notesMasterIdLst>
   <p:sldIdLst>
     <p:sldId id="263" r:id="rId2"/>
@@ -65,6 +65,10 @@
     <p:sldId id="357" r:id="rId56"/>
     <p:sldId id="358" r:id="rId57"/>
     <p:sldId id="359" r:id="rId58"/>
+    <p:sldId id="360" r:id="rId59"/>
+    <p:sldId id="361" r:id="rId60"/>
+    <p:sldId id="362" r:id="rId61"/>
+    <p:sldId id="363" r:id="rId62"/>
   </p:sldIdLst>
   <p:sldSz cx="6667500" cy="5772150"/>
   <p:notesSz cx="6858000" cy="9144000"/>
@@ -354,6 +358,14 @@
             <p14:sldId id="359"/>
           </p14:sldIdLst>
         </p14:section>
+        <p14:section name="d2d section" id="{D1DF0642-BB50-C540-9198-2D6274D0EBF7}">
+          <p14:sldIdLst>
+            <p14:sldId id="360"/>
+            <p14:sldId id="361"/>
+            <p14:sldId id="362"/>
+            <p14:sldId id="363"/>
+          </p14:sldIdLst>
+        </p14:section>
       </p14:sectionLst>
     </p:ext>
   </p:extLst>
@@ -5975,12 +5987,12 @@
 </p:notes>
 </file>
 
-<file path=ppt/notesSlides/notesSlide6.xml><?xml version="1.0" encoding="utf-8"?>
+<file path=ppt/notesSlides/notesSlide58.xml><?xml version="1.0" encoding="utf-8"?>
 <p:notes xmlns:a="http://schemas.openxmlformats.org/drawingml/2006/main" xmlns:r="http://schemas.openxmlformats.org/officeDocument/2006/relationships" xmlns:p="http://schemas.openxmlformats.org/presentationml/2006/main" showMasterSp="0" showMasterPhAnim="0">
   <p:cSld>
     <p:spTree>
       <p:nvGrpSpPr>
-        <p:cNvPr id="1" name="Shape 147"/>
+        <p:cNvPr id="1" name="Shape 1213"/>
         <p:cNvGrpSpPr/>
         <p:nvPr/>
       </p:nvGrpSpPr>
@@ -5994,7 +6006,7 @@
       </p:grpSpPr>
       <p:sp>
         <p:nvSpPr>
-          <p:cNvPr id="148" name="Shape 148"/>
+          <p:cNvPr id="1214" name="Shape 1214"/>
           <p:cNvSpPr>
             <a:spLocks noGrp="1" noRot="1" noChangeAspect="1"/>
           </p:cNvSpPr>
@@ -6035,7 +6047,411 @@
       </p:sp>
       <p:sp>
         <p:nvSpPr>
+          <p:cNvPr id="1215" name="Shape 1215"/>
+          <p:cNvSpPr txBox="1">
+            <a:spLocks noGrp="1"/>
+          </p:cNvSpPr>
+          <p:nvPr>
+            <p:ph type="body" idx="1"/>
+          </p:nvPr>
+        </p:nvSpPr>
+        <p:spPr>
+          <a:xfrm>
+            <a:off x="685800" y="4343400"/>
+            <a:ext cx="5486400" cy="4114800"/>
+          </a:xfrm>
+          <a:prstGeom prst="rect">
+            <a:avLst/>
+          </a:prstGeom>
+        </p:spPr>
+        <p:txBody>
+          <a:bodyPr lIns="91425" tIns="91425" rIns="91425" bIns="91425" anchor="t" anchorCtr="0">
+            <a:noAutofit/>
+          </a:bodyPr>
+          <a:lstStyle/>
+          <a:p>
+            <a:pPr lvl="0" rtl="0">
+              <a:spcBef>
+                <a:spcPts val="0"/>
+              </a:spcBef>
+              <a:buNone/>
+            </a:pPr>
+            <a:endParaRPr/>
+          </a:p>
+        </p:txBody>
+      </p:sp>
+    </p:spTree>
+  </p:cSld>
+  <p:clrMapOvr>
+    <a:masterClrMapping/>
+  </p:clrMapOvr>
+</p:notes>
+</file>
+
+<file path=ppt/notesSlides/notesSlide59.xml><?xml version="1.0" encoding="utf-8"?>
+<p:notes xmlns:a="http://schemas.openxmlformats.org/drawingml/2006/main" xmlns:r="http://schemas.openxmlformats.org/officeDocument/2006/relationships" xmlns:p="http://schemas.openxmlformats.org/presentationml/2006/main" showMasterSp="0" showMasterPhAnim="0">
+  <p:cSld>
+    <p:spTree>
+      <p:nvGrpSpPr>
+        <p:cNvPr id="1" name="Shape 1213"/>
+        <p:cNvGrpSpPr/>
+        <p:nvPr/>
+      </p:nvGrpSpPr>
+      <p:grpSpPr>
+        <a:xfrm>
+          <a:off x="0" y="0"/>
+          <a:ext cx="0" cy="0"/>
+          <a:chOff x="0" y="0"/>
+          <a:chExt cx="0" cy="0"/>
+        </a:xfrm>
+      </p:grpSpPr>
+      <p:sp>
+        <p:nvSpPr>
+          <p:cNvPr id="1214" name="Shape 1214"/>
+          <p:cNvSpPr>
+            <a:spLocks noGrp="1" noRot="1" noChangeAspect="1"/>
+          </p:cNvSpPr>
+          <p:nvPr>
+            <p:ph type="sldImg" idx="2"/>
+          </p:nvPr>
+        </p:nvSpPr>
+        <p:spPr>
+          <a:xfrm>
+            <a:off x="1449388" y="685800"/>
+            <a:ext cx="3960812" cy="3429000"/>
+          </a:xfrm>
+          <a:custGeom>
+            <a:avLst/>
+            <a:gdLst/>
+            <a:ahLst/>
+            <a:cxnLst/>
+            <a:rect l="0" t="0" r="0" b="0"/>
+            <a:pathLst>
+              <a:path w="120000" h="120000" extrusionOk="0">
+                <a:moveTo>
+                  <a:pt x="0" y="0"/>
+                </a:moveTo>
+                <a:lnTo>
+                  <a:pt x="120000" y="0"/>
+                </a:lnTo>
+                <a:lnTo>
+                  <a:pt x="120000" y="120000"/>
+                </a:lnTo>
+                <a:lnTo>
+                  <a:pt x="0" y="120000"/>
+                </a:lnTo>
+                <a:close/>
+              </a:path>
+            </a:pathLst>
+          </a:custGeom>
+        </p:spPr>
+      </p:sp>
+      <p:sp>
+        <p:nvSpPr>
+          <p:cNvPr id="1215" name="Shape 1215"/>
+          <p:cNvSpPr txBox="1">
+            <a:spLocks noGrp="1"/>
+          </p:cNvSpPr>
+          <p:nvPr>
+            <p:ph type="body" idx="1"/>
+          </p:nvPr>
+        </p:nvSpPr>
+        <p:spPr>
+          <a:xfrm>
+            <a:off x="685800" y="4343400"/>
+            <a:ext cx="5486400" cy="4114800"/>
+          </a:xfrm>
+          <a:prstGeom prst="rect">
+            <a:avLst/>
+          </a:prstGeom>
+        </p:spPr>
+        <p:txBody>
+          <a:bodyPr lIns="91425" tIns="91425" rIns="91425" bIns="91425" anchor="t" anchorCtr="0">
+            <a:noAutofit/>
+          </a:bodyPr>
+          <a:lstStyle/>
+          <a:p>
+            <a:pPr lvl="0" rtl="0">
+              <a:spcBef>
+                <a:spcPts val="0"/>
+              </a:spcBef>
+              <a:buNone/>
+            </a:pPr>
+            <a:endParaRPr/>
+          </a:p>
+        </p:txBody>
+      </p:sp>
+    </p:spTree>
+  </p:cSld>
+  <p:clrMapOvr>
+    <a:masterClrMapping/>
+  </p:clrMapOvr>
+</p:notes>
+</file>
+
+<file path=ppt/notesSlides/notesSlide6.xml><?xml version="1.0" encoding="utf-8"?>
+<p:notes xmlns:a="http://schemas.openxmlformats.org/drawingml/2006/main" xmlns:r="http://schemas.openxmlformats.org/officeDocument/2006/relationships" xmlns:p="http://schemas.openxmlformats.org/presentationml/2006/main" showMasterSp="0" showMasterPhAnim="0">
+  <p:cSld>
+    <p:spTree>
+      <p:nvGrpSpPr>
+        <p:cNvPr id="1" name="Shape 147"/>
+        <p:cNvGrpSpPr/>
+        <p:nvPr/>
+      </p:nvGrpSpPr>
+      <p:grpSpPr>
+        <a:xfrm>
+          <a:off x="0" y="0"/>
+          <a:ext cx="0" cy="0"/>
+          <a:chOff x="0" y="0"/>
+          <a:chExt cx="0" cy="0"/>
+        </a:xfrm>
+      </p:grpSpPr>
+      <p:sp>
+        <p:nvSpPr>
+          <p:cNvPr id="148" name="Shape 148"/>
+          <p:cNvSpPr>
+            <a:spLocks noGrp="1" noRot="1" noChangeAspect="1"/>
+          </p:cNvSpPr>
+          <p:nvPr>
+            <p:ph type="sldImg" idx="2"/>
+          </p:nvPr>
+        </p:nvSpPr>
+        <p:spPr>
+          <a:xfrm>
+            <a:off x="1449388" y="685800"/>
+            <a:ext cx="3960812" cy="3429000"/>
+          </a:xfrm>
+          <a:custGeom>
+            <a:avLst/>
+            <a:gdLst/>
+            <a:ahLst/>
+            <a:cxnLst/>
+            <a:rect l="0" t="0" r="0" b="0"/>
+            <a:pathLst>
+              <a:path w="120000" h="120000" extrusionOk="0">
+                <a:moveTo>
+                  <a:pt x="0" y="0"/>
+                </a:moveTo>
+                <a:lnTo>
+                  <a:pt x="120000" y="0"/>
+                </a:lnTo>
+                <a:lnTo>
+                  <a:pt x="120000" y="120000"/>
+                </a:lnTo>
+                <a:lnTo>
+                  <a:pt x="0" y="120000"/>
+                </a:lnTo>
+                <a:close/>
+              </a:path>
+            </a:pathLst>
+          </a:custGeom>
+        </p:spPr>
+      </p:sp>
+      <p:sp>
+        <p:nvSpPr>
           <p:cNvPr id="149" name="Shape 149"/>
+          <p:cNvSpPr txBox="1">
+            <a:spLocks noGrp="1"/>
+          </p:cNvSpPr>
+          <p:nvPr>
+            <p:ph type="body" idx="1"/>
+          </p:nvPr>
+        </p:nvSpPr>
+        <p:spPr>
+          <a:xfrm>
+            <a:off x="685800" y="4343400"/>
+            <a:ext cx="5486400" cy="4114800"/>
+          </a:xfrm>
+          <a:prstGeom prst="rect">
+            <a:avLst/>
+          </a:prstGeom>
+        </p:spPr>
+        <p:txBody>
+          <a:bodyPr lIns="91425" tIns="91425" rIns="91425" bIns="91425" anchor="t" anchorCtr="0">
+            <a:noAutofit/>
+          </a:bodyPr>
+          <a:lstStyle/>
+          <a:p>
+            <a:pPr lvl="0" rtl="0">
+              <a:spcBef>
+                <a:spcPts val="0"/>
+              </a:spcBef>
+              <a:buNone/>
+            </a:pPr>
+            <a:endParaRPr/>
+          </a:p>
+        </p:txBody>
+      </p:sp>
+    </p:spTree>
+  </p:cSld>
+  <p:clrMapOvr>
+    <a:masterClrMapping/>
+  </p:clrMapOvr>
+</p:notes>
+</file>
+
+<file path=ppt/notesSlides/notesSlide60.xml><?xml version="1.0" encoding="utf-8"?>
+<p:notes xmlns:a="http://schemas.openxmlformats.org/drawingml/2006/main" xmlns:r="http://schemas.openxmlformats.org/officeDocument/2006/relationships" xmlns:p="http://schemas.openxmlformats.org/presentationml/2006/main" showMasterSp="0" showMasterPhAnim="0">
+  <p:cSld>
+    <p:spTree>
+      <p:nvGrpSpPr>
+        <p:cNvPr id="1" name="Shape 1213"/>
+        <p:cNvGrpSpPr/>
+        <p:nvPr/>
+      </p:nvGrpSpPr>
+      <p:grpSpPr>
+        <a:xfrm>
+          <a:off x="0" y="0"/>
+          <a:ext cx="0" cy="0"/>
+          <a:chOff x="0" y="0"/>
+          <a:chExt cx="0" cy="0"/>
+        </a:xfrm>
+      </p:grpSpPr>
+      <p:sp>
+        <p:nvSpPr>
+          <p:cNvPr id="1214" name="Shape 1214"/>
+          <p:cNvSpPr>
+            <a:spLocks noGrp="1" noRot="1" noChangeAspect="1"/>
+          </p:cNvSpPr>
+          <p:nvPr>
+            <p:ph type="sldImg" idx="2"/>
+          </p:nvPr>
+        </p:nvSpPr>
+        <p:spPr>
+          <a:xfrm>
+            <a:off x="1449388" y="685800"/>
+            <a:ext cx="3960812" cy="3429000"/>
+          </a:xfrm>
+          <a:custGeom>
+            <a:avLst/>
+            <a:gdLst/>
+            <a:ahLst/>
+            <a:cxnLst/>
+            <a:rect l="0" t="0" r="0" b="0"/>
+            <a:pathLst>
+              <a:path w="120000" h="120000" extrusionOk="0">
+                <a:moveTo>
+                  <a:pt x="0" y="0"/>
+                </a:moveTo>
+                <a:lnTo>
+                  <a:pt x="120000" y="0"/>
+                </a:lnTo>
+                <a:lnTo>
+                  <a:pt x="120000" y="120000"/>
+                </a:lnTo>
+                <a:lnTo>
+                  <a:pt x="0" y="120000"/>
+                </a:lnTo>
+                <a:close/>
+              </a:path>
+            </a:pathLst>
+          </a:custGeom>
+        </p:spPr>
+      </p:sp>
+      <p:sp>
+        <p:nvSpPr>
+          <p:cNvPr id="1215" name="Shape 1215"/>
+          <p:cNvSpPr txBox="1">
+            <a:spLocks noGrp="1"/>
+          </p:cNvSpPr>
+          <p:nvPr>
+            <p:ph type="body" idx="1"/>
+          </p:nvPr>
+        </p:nvSpPr>
+        <p:spPr>
+          <a:xfrm>
+            <a:off x="685800" y="4343400"/>
+            <a:ext cx="5486400" cy="4114800"/>
+          </a:xfrm>
+          <a:prstGeom prst="rect">
+            <a:avLst/>
+          </a:prstGeom>
+        </p:spPr>
+        <p:txBody>
+          <a:bodyPr lIns="91425" tIns="91425" rIns="91425" bIns="91425" anchor="t" anchorCtr="0">
+            <a:noAutofit/>
+          </a:bodyPr>
+          <a:lstStyle/>
+          <a:p>
+            <a:pPr lvl="0" rtl="0">
+              <a:spcBef>
+                <a:spcPts val="0"/>
+              </a:spcBef>
+              <a:buNone/>
+            </a:pPr>
+            <a:endParaRPr/>
+          </a:p>
+        </p:txBody>
+      </p:sp>
+    </p:spTree>
+  </p:cSld>
+  <p:clrMapOvr>
+    <a:masterClrMapping/>
+  </p:clrMapOvr>
+</p:notes>
+</file>
+
+<file path=ppt/notesSlides/notesSlide61.xml><?xml version="1.0" encoding="utf-8"?>
+<p:notes xmlns:a="http://schemas.openxmlformats.org/drawingml/2006/main" xmlns:r="http://schemas.openxmlformats.org/officeDocument/2006/relationships" xmlns:p="http://schemas.openxmlformats.org/presentationml/2006/main" showMasterSp="0" showMasterPhAnim="0">
+  <p:cSld>
+    <p:spTree>
+      <p:nvGrpSpPr>
+        <p:cNvPr id="1" name="Shape 1213"/>
+        <p:cNvGrpSpPr/>
+        <p:nvPr/>
+      </p:nvGrpSpPr>
+      <p:grpSpPr>
+        <a:xfrm>
+          <a:off x="0" y="0"/>
+          <a:ext cx="0" cy="0"/>
+          <a:chOff x="0" y="0"/>
+          <a:chExt cx="0" cy="0"/>
+        </a:xfrm>
+      </p:grpSpPr>
+      <p:sp>
+        <p:nvSpPr>
+          <p:cNvPr id="1214" name="Shape 1214"/>
+          <p:cNvSpPr>
+            <a:spLocks noGrp="1" noRot="1" noChangeAspect="1"/>
+          </p:cNvSpPr>
+          <p:nvPr>
+            <p:ph type="sldImg" idx="2"/>
+          </p:nvPr>
+        </p:nvSpPr>
+        <p:spPr>
+          <a:xfrm>
+            <a:off x="1449388" y="685800"/>
+            <a:ext cx="3960812" cy="3429000"/>
+          </a:xfrm>
+          <a:custGeom>
+            <a:avLst/>
+            <a:gdLst/>
+            <a:ahLst/>
+            <a:cxnLst/>
+            <a:rect l="0" t="0" r="0" b="0"/>
+            <a:pathLst>
+              <a:path w="120000" h="120000" extrusionOk="0">
+                <a:moveTo>
+                  <a:pt x="0" y="0"/>
+                </a:moveTo>
+                <a:lnTo>
+                  <a:pt x="120000" y="0"/>
+                </a:lnTo>
+                <a:lnTo>
+                  <a:pt x="120000" y="120000"/>
+                </a:lnTo>
+                <a:lnTo>
+                  <a:pt x="0" y="120000"/>
+                </a:lnTo>
+                <a:close/>
+              </a:path>
+            </a:pathLst>
+          </a:custGeom>
+        </p:spPr>
+      </p:sp>
+      <p:sp>
+        <p:nvSpPr>
+          <p:cNvPr id="1215" name="Shape 1215"/>
           <p:cNvSpPr txBox="1">
             <a:spLocks noGrp="1"/>
           </p:cNvSpPr>
@@ -59419,6 +59835,1666 @@
 </p:sld>
 </file>
 
+<file path=ppt/slides/slide58.xml><?xml version="1.0" encoding="utf-8"?>
+<p:sld xmlns:a="http://schemas.openxmlformats.org/drawingml/2006/main" xmlns:r="http://schemas.openxmlformats.org/officeDocument/2006/relationships" xmlns:p="http://schemas.openxmlformats.org/presentationml/2006/main">
+  <p:cSld>
+    <p:spTree>
+      <p:nvGrpSpPr>
+        <p:cNvPr id="1" name="Shape 1216"/>
+        <p:cNvGrpSpPr/>
+        <p:nvPr/>
+      </p:nvGrpSpPr>
+      <p:grpSpPr>
+        <a:xfrm>
+          <a:off x="0" y="0"/>
+          <a:ext cx="0" cy="0"/>
+          <a:chOff x="0" y="0"/>
+          <a:chExt cx="0" cy="0"/>
+        </a:xfrm>
+      </p:grpSpPr>
+      <p:pic>
+        <p:nvPicPr>
+          <p:cNvPr id="3" name="Picture 2"/>
+          <p:cNvPicPr>
+            <a:picLocks noChangeAspect="1"/>
+          </p:cNvPicPr>
+          <p:nvPr/>
+        </p:nvPicPr>
+        <p:blipFill>
+          <a:blip r:embed="rId3"/>
+          <a:stretch>
+            <a:fillRect/>
+          </a:stretch>
+        </p:blipFill>
+        <p:spPr>
+          <a:xfrm>
+            <a:off x="2761918" y="3036621"/>
+            <a:ext cx="902179" cy="902179"/>
+          </a:xfrm>
+          <a:prstGeom prst="rect">
+            <a:avLst/>
+          </a:prstGeom>
+        </p:spPr>
+      </p:pic>
+      <p:grpSp>
+        <p:nvGrpSpPr>
+          <p:cNvPr id="23" name="Group 22"/>
+          <p:cNvGrpSpPr/>
+          <p:nvPr/>
+        </p:nvGrpSpPr>
+        <p:grpSpPr>
+          <a:xfrm>
+            <a:off x="3834904" y="1753293"/>
+            <a:ext cx="2287095" cy="1345507"/>
+            <a:chOff x="3834904" y="1753293"/>
+            <a:chExt cx="2287095" cy="1345507"/>
+          </a:xfrm>
+        </p:grpSpPr>
+        <p:grpSp>
+          <p:nvGrpSpPr>
+            <p:cNvPr id="24" name="Group 23"/>
+            <p:cNvGrpSpPr/>
+            <p:nvPr/>
+          </p:nvGrpSpPr>
+          <p:grpSpPr>
+            <a:xfrm>
+              <a:off x="3834904" y="1753293"/>
+              <a:ext cx="2287095" cy="1345507"/>
+              <a:chOff x="3834904" y="1753293"/>
+              <a:chExt cx="2287095" cy="1345507"/>
+            </a:xfrm>
+          </p:grpSpPr>
+          <p:sp>
+            <p:nvSpPr>
+              <p:cNvPr id="26" name="Cloud 25"/>
+              <p:cNvSpPr/>
+              <p:nvPr/>
+            </p:nvSpPr>
+            <p:spPr>
+              <a:xfrm>
+                <a:off x="3834904" y="1753293"/>
+                <a:ext cx="2015480" cy="1345507"/>
+              </a:xfrm>
+              <a:prstGeom prst="cloud">
+                <a:avLst/>
+              </a:prstGeom>
+              <a:gradFill flip="none" rotWithShape="1">
+                <a:gsLst>
+                  <a:gs pos="0">
+                    <a:srgbClr val="D16349">
+                      <a:shade val="15000"/>
+                      <a:satMod val="180000"/>
+                      <a:alpha val="73000"/>
+                    </a:srgbClr>
+                  </a:gs>
+                  <a:gs pos="50000">
+                    <a:srgbClr val="D16349">
+                      <a:shade val="45000"/>
+                      <a:satMod val="170000"/>
+                      <a:alpha val="73000"/>
+                    </a:srgbClr>
+                  </a:gs>
+                  <a:gs pos="70000">
+                    <a:srgbClr val="D16349">
+                      <a:tint val="99000"/>
+                      <a:shade val="65000"/>
+                      <a:satMod val="155000"/>
+                      <a:alpha val="73000"/>
+                    </a:srgbClr>
+                  </a:gs>
+                  <a:gs pos="100000">
+                    <a:srgbClr val="D16349">
+                      <a:tint val="95500"/>
+                      <a:shade val="100000"/>
+                      <a:satMod val="155000"/>
+                      <a:alpha val="73000"/>
+                    </a:srgbClr>
+                  </a:gs>
+                </a:gsLst>
+                <a:lin ang="16200000" scaled="0"/>
+                <a:tileRect/>
+              </a:gradFill>
+              <a:ln w="9525" cap="flat" cmpd="sng" algn="ctr">
+                <a:solidFill>
+                  <a:srgbClr val="D16349"/>
+                </a:solidFill>
+                <a:prstDash val="solid"/>
+              </a:ln>
+              <a:effectLst>
+                <a:outerShdw blurRad="50800" dist="38100" dir="5400000" rotWithShape="0">
+                  <a:srgbClr val="000000">
+                    <a:alpha val="35000"/>
+                  </a:srgbClr>
+                </a:outerShdw>
+              </a:effectLst>
+            </p:spPr>
+            <p:txBody>
+              <a:bodyPr rtlCol="0" anchor="ctr"/>
+              <a:lstStyle/>
+              <a:p>
+                <a:pPr marL="0" marR="0" lvl="0" indent="0" algn="ctr" defTabSz="914400" eaLnBrk="1" fontAlgn="auto" latinLnBrk="0" hangingPunct="1">
+                  <a:lnSpc>
+                    <a:spcPct val="100000"/>
+                  </a:lnSpc>
+                  <a:spcBef>
+                    <a:spcPts val="0"/>
+                  </a:spcBef>
+                  <a:spcAft>
+                    <a:spcPts val="0"/>
+                  </a:spcAft>
+                  <a:buClrTx/>
+                  <a:buSzTx/>
+                  <a:buFontTx/>
+                  <a:buNone/>
+                  <a:tabLst/>
+                  <a:defRPr/>
+                </a:pPr>
+                <a:endParaRPr kumimoji="0" lang="en-US" sz="1800" b="0" i="0" u="none" strike="noStrike" kern="0" cap="none" spc="0" normalizeH="0" baseline="0" noProof="0">
+                  <a:ln>
+                    <a:noFill/>
+                  </a:ln>
+                  <a:solidFill>
+                    <a:sysClr val="window" lastClr="FFFFFF"/>
+                  </a:solidFill>
+                  <a:effectLst/>
+                  <a:uLnTx/>
+                  <a:uFillTx/>
+                  <a:latin typeface="Lucida Sans Unicode"/>
+                  <a:ea typeface="+mn-ea"/>
+                  <a:cs typeface="+mn-cs"/>
+                </a:endParaRPr>
+              </a:p>
+            </p:txBody>
+          </p:sp>
+          <p:pic>
+            <p:nvPicPr>
+              <p:cNvPr id="27" name="Picture 26"/>
+              <p:cNvPicPr>
+                <a:picLocks noChangeAspect="1"/>
+              </p:cNvPicPr>
+              <p:nvPr/>
+            </p:nvPicPr>
+            <p:blipFill>
+              <a:blip r:embed="rId4">
+                <a:alphaModFix amt="30000"/>
+              </a:blip>
+              <a:stretch>
+                <a:fillRect/>
+              </a:stretch>
+            </p:blipFill>
+            <p:spPr>
+              <a:xfrm>
+                <a:off x="4738264" y="1971848"/>
+                <a:ext cx="875136" cy="493814"/>
+              </a:xfrm>
+              <a:prstGeom prst="rect">
+                <a:avLst/>
+              </a:prstGeom>
+            </p:spPr>
+          </p:pic>
+          <p:sp>
+            <p:nvSpPr>
+              <p:cNvPr id="28" name="Shape 165"/>
+              <p:cNvSpPr txBox="1"/>
+              <p:nvPr/>
+            </p:nvSpPr>
+            <p:spPr>
+              <a:xfrm rot="-1650">
+                <a:off x="4842725" y="1959299"/>
+                <a:ext cx="625200" cy="333600"/>
+              </a:xfrm>
+              <a:prstGeom prst="rect">
+                <a:avLst/>
+              </a:prstGeom>
+              <a:noFill/>
+              <a:ln>
+                <a:noFill/>
+              </a:ln>
+            </p:spPr>
+            <p:txBody>
+              <a:bodyPr lIns="91425" tIns="91425" rIns="91425" bIns="91425" anchor="t" anchorCtr="0">
+                <a:noAutofit/>
+              </a:bodyPr>
+              <a:lstStyle/>
+              <a:p>
+                <a:pPr lvl="0" rtl="0">
+                  <a:spcBef>
+                    <a:spcPts val="0"/>
+                  </a:spcBef>
+                  <a:buNone/>
+                </a:pPr>
+                <a:r>
+                  <a:rPr lang="en" sz="1200" b="1">
+                    <a:solidFill>
+                      <a:srgbClr val="351C75"/>
+                    </a:solidFill>
+                  </a:rPr>
+                  <a:t>VMM</a:t>
+                </a:r>
+              </a:p>
+            </p:txBody>
+          </p:sp>
+          <p:sp>
+            <p:nvSpPr>
+              <p:cNvPr id="29" name="Shape 167"/>
+              <p:cNvSpPr txBox="1"/>
+              <p:nvPr/>
+            </p:nvSpPr>
+            <p:spPr>
+              <a:xfrm rot="-2329">
+                <a:off x="5236399" y="2373072"/>
+                <a:ext cx="885600" cy="523500"/>
+              </a:xfrm>
+              <a:prstGeom prst="rect">
+                <a:avLst/>
+              </a:prstGeom>
+              <a:noFill/>
+              <a:ln>
+                <a:noFill/>
+              </a:ln>
+            </p:spPr>
+            <p:txBody>
+              <a:bodyPr lIns="91425" tIns="91425" rIns="91425" bIns="91425" anchor="t" anchorCtr="0">
+                <a:noAutofit/>
+              </a:bodyPr>
+              <a:lstStyle/>
+              <a:p>
+                <a:pPr lvl="0" rtl="0">
+                  <a:spcBef>
+                    <a:spcPts val="0"/>
+                  </a:spcBef>
+                  <a:buNone/>
+                </a:pPr>
+                <a:r>
+                  <a:rPr lang="en" sz="1200" b="1">
+                    <a:solidFill>
+                      <a:srgbClr val="351C75"/>
+                    </a:solidFill>
+                  </a:rPr>
+                  <a:t>Physical Machine</a:t>
+                </a:r>
+              </a:p>
+            </p:txBody>
+          </p:sp>
+        </p:grpSp>
+        <p:pic>
+          <p:nvPicPr>
+            <p:cNvPr id="25" name="Picture 24"/>
+            <p:cNvPicPr>
+              <a:picLocks noChangeAspect="1"/>
+            </p:cNvPicPr>
+            <p:nvPr/>
+          </p:nvPicPr>
+          <p:blipFill>
+            <a:blip r:embed="rId5">
+              <a:alphaModFix amt="30000"/>
+            </a:blip>
+            <a:stretch>
+              <a:fillRect/>
+            </a:stretch>
+          </p:blipFill>
+          <p:spPr>
+            <a:xfrm>
+              <a:off x="4230074" y="2360072"/>
+              <a:ext cx="380054" cy="453954"/>
+            </a:xfrm>
+            <a:prstGeom prst="rect">
+              <a:avLst/>
+            </a:prstGeom>
+          </p:spPr>
+        </p:pic>
+      </p:grpSp>
+      <p:sp>
+        <p:nvSpPr>
+          <p:cNvPr id="1221" name="Shape 1221"/>
+          <p:cNvSpPr txBox="1"/>
+          <p:nvPr/>
+        </p:nvSpPr>
+        <p:spPr>
+          <a:xfrm rot="-2332">
+            <a:off x="1468511" y="1243554"/>
+            <a:ext cx="442200" cy="333600"/>
+          </a:xfrm>
+          <a:prstGeom prst="rect">
+            <a:avLst/>
+          </a:prstGeom>
+          <a:noFill/>
+          <a:ln>
+            <a:noFill/>
+          </a:ln>
+        </p:spPr>
+        <p:txBody>
+          <a:bodyPr lIns="91425" tIns="91425" rIns="91425" bIns="91425" anchor="t" anchorCtr="0">
+            <a:noAutofit/>
+          </a:bodyPr>
+          <a:lstStyle/>
+          <a:p>
+            <a:pPr lvl="0" rtl="0">
+              <a:spcBef>
+                <a:spcPts val="0"/>
+              </a:spcBef>
+              <a:buNone/>
+            </a:pPr>
+            <a:r>
+              <a:rPr lang="en" sz="1200" b="1">
+                <a:solidFill>
+                  <a:srgbClr val="351C75"/>
+                </a:solidFill>
+              </a:rPr>
+              <a:t>DS</a:t>
+            </a:r>
+          </a:p>
+        </p:txBody>
+      </p:sp>
+      <p:sp>
+        <p:nvSpPr>
+          <p:cNvPr id="1223" name="Shape 1223"/>
+          <p:cNvSpPr txBox="1"/>
+          <p:nvPr/>
+        </p:nvSpPr>
+        <p:spPr>
+          <a:xfrm rot="-3033">
+            <a:off x="3213156" y="162586"/>
+            <a:ext cx="680100" cy="333600"/>
+          </a:xfrm>
+          <a:prstGeom prst="rect">
+            <a:avLst/>
+          </a:prstGeom>
+          <a:noFill/>
+          <a:ln>
+            <a:noFill/>
+          </a:ln>
+        </p:spPr>
+        <p:txBody>
+          <a:bodyPr lIns="91425" tIns="91425" rIns="91425" bIns="91425" anchor="t" anchorCtr="0">
+            <a:noAutofit/>
+          </a:bodyPr>
+          <a:lstStyle/>
+          <a:p>
+            <a:pPr lvl="0" rtl="0">
+              <a:spcBef>
+                <a:spcPts val="0"/>
+              </a:spcBef>
+              <a:buNone/>
+            </a:pPr>
+            <a:r>
+              <a:rPr lang="en" sz="1200" b="1">
+                <a:solidFill>
+                  <a:srgbClr val="351C75"/>
+                </a:solidFill>
+              </a:rPr>
+              <a:t>SLAM</a:t>
+            </a:r>
+          </a:p>
+        </p:txBody>
+      </p:sp>
+      <p:sp>
+        <p:nvSpPr>
+          <p:cNvPr id="1224" name="Shape 1224"/>
+          <p:cNvSpPr txBox="1"/>
+          <p:nvPr/>
+        </p:nvSpPr>
+        <p:spPr>
+          <a:xfrm rot="-2329">
+            <a:off x="5236399" y="2373072"/>
+            <a:ext cx="885600" cy="523500"/>
+          </a:xfrm>
+          <a:prstGeom prst="rect">
+            <a:avLst/>
+          </a:prstGeom>
+          <a:noFill/>
+          <a:ln>
+            <a:noFill/>
+          </a:ln>
+        </p:spPr>
+        <p:txBody>
+          <a:bodyPr lIns="91425" tIns="91425" rIns="91425" bIns="91425" anchor="t" anchorCtr="0">
+            <a:noAutofit/>
+          </a:bodyPr>
+          <a:lstStyle/>
+          <a:p>
+            <a:pPr lvl="0" rtl="0">
+              <a:spcBef>
+                <a:spcPts val="0"/>
+              </a:spcBef>
+              <a:buNone/>
+            </a:pPr>
+            <a:r>
+              <a:rPr lang="en" sz="1200" b="1">
+                <a:solidFill>
+                  <a:srgbClr val="351C75"/>
+                </a:solidFill>
+              </a:rPr>
+              <a:t>Physical Machine</a:t>
+            </a:r>
+          </a:p>
+        </p:txBody>
+      </p:sp>
+      <p:pic>
+        <p:nvPicPr>
+          <p:cNvPr id="1225" name="Shape 1225" descr="Untitled.png"/>
+          <p:cNvPicPr preferRelativeResize="0"/>
+          <p:nvPr/>
+        </p:nvPicPr>
+        <p:blipFill>
+          <a:blip r:embed="rId6">
+            <a:alphaModFix/>
+          </a:blip>
+          <a:stretch>
+            <a:fillRect/>
+          </a:stretch>
+        </p:blipFill>
+        <p:spPr>
+          <a:xfrm>
+            <a:off x="925600" y="4075700"/>
+            <a:ext cx="245601" cy="602400"/>
+          </a:xfrm>
+          <a:prstGeom prst="rect">
+            <a:avLst/>
+          </a:prstGeom>
+          <a:noFill/>
+          <a:ln>
+            <a:noFill/>
+          </a:ln>
+        </p:spPr>
+      </p:pic>
+      <p:sp>
+        <p:nvSpPr>
+          <p:cNvPr id="1226" name="Shape 1226"/>
+          <p:cNvSpPr txBox="1"/>
+          <p:nvPr/>
+        </p:nvSpPr>
+        <p:spPr>
+          <a:xfrm rot="-2630">
+            <a:off x="771253" y="4621351"/>
+            <a:ext cx="784200" cy="333600"/>
+          </a:xfrm>
+          <a:prstGeom prst="rect">
+            <a:avLst/>
+          </a:prstGeom>
+          <a:noFill/>
+          <a:ln>
+            <a:noFill/>
+          </a:ln>
+        </p:spPr>
+        <p:txBody>
+          <a:bodyPr lIns="91425" tIns="91425" rIns="91425" bIns="91425" anchor="t" anchorCtr="0">
+            <a:noAutofit/>
+          </a:bodyPr>
+          <a:lstStyle/>
+          <a:p>
+            <a:pPr lvl="0" rtl="0">
+              <a:spcBef>
+                <a:spcPts val="0"/>
+              </a:spcBef>
+              <a:buNone/>
+            </a:pPr>
+            <a:r>
+              <a:rPr lang="en" sz="1200" b="1">
+                <a:solidFill>
+                  <a:srgbClr val="351C75"/>
+                </a:solidFill>
+              </a:rPr>
+              <a:t>Client</a:t>
+            </a:r>
+          </a:p>
+        </p:txBody>
+      </p:sp>
+      <p:pic>
+        <p:nvPicPr>
+          <p:cNvPr id="20" name="Picture 19"/>
+          <p:cNvPicPr>
+            <a:picLocks noChangeAspect="1"/>
+          </p:cNvPicPr>
+          <p:nvPr/>
+        </p:nvPicPr>
+        <p:blipFill>
+          <a:blip r:embed="rId7">
+            <a:alphaModFix amt="30000"/>
+          </a:blip>
+          <a:stretch>
+            <a:fillRect/>
+          </a:stretch>
+        </p:blipFill>
+        <p:spPr>
+          <a:xfrm>
+            <a:off x="1335856" y="1502300"/>
+            <a:ext cx="375208" cy="526889"/>
+          </a:xfrm>
+          <a:prstGeom prst="rect">
+            <a:avLst/>
+          </a:prstGeom>
+          <a:ln>
+            <a:noFill/>
+          </a:ln>
+          <a:effectLst>
+            <a:outerShdw blurRad="292100" dist="139700" dir="2700000" algn="tl" rotWithShape="0">
+              <a:srgbClr val="333333">
+                <a:alpha val="65000"/>
+              </a:srgbClr>
+            </a:outerShdw>
+          </a:effectLst>
+        </p:spPr>
+      </p:pic>
+      <p:pic>
+        <p:nvPicPr>
+          <p:cNvPr id="22" name="Picture 21" descr="service-_level-agreement.png"/>
+          <p:cNvPicPr>
+            <a:picLocks noChangeAspect="1"/>
+          </p:cNvPicPr>
+          <p:nvPr/>
+        </p:nvPicPr>
+        <p:blipFill rotWithShape="1">
+          <a:blip r:embed="rId8">
+            <a:alphaModFix amt="30000"/>
+            <a:extLst>
+              <a:ext uri="{28A0092B-C50C-407E-A947-70E740481C1C}">
+                <a14:useLocalDpi xmlns:a14="http://schemas.microsoft.com/office/drawing/2010/main" val="0"/>
+              </a:ext>
+            </a:extLst>
+          </a:blip>
+          <a:srcRect l="24058" t="14272" r="19175" b="16715"/>
+          <a:stretch/>
+        </p:blipFill>
+        <p:spPr>
+          <a:xfrm>
+            <a:off x="3325523" y="413792"/>
+            <a:ext cx="411772" cy="500608"/>
+          </a:xfrm>
+          <a:prstGeom prst="rect">
+            <a:avLst/>
+          </a:prstGeom>
+        </p:spPr>
+      </p:pic>
+      <p:pic>
+        <p:nvPicPr>
+          <p:cNvPr id="2" name="Picture 1"/>
+          <p:cNvPicPr>
+            <a:picLocks noChangeAspect="1"/>
+          </p:cNvPicPr>
+          <p:nvPr/>
+        </p:nvPicPr>
+        <p:blipFill rotWithShape="1">
+          <a:blip r:embed="rId9"/>
+          <a:srcRect l="35334" t="11001" r="32333" b="10786"/>
+          <a:stretch/>
+        </p:blipFill>
+        <p:spPr>
+          <a:xfrm>
+            <a:off x="5236221" y="3907040"/>
+            <a:ext cx="381000" cy="921625"/>
+          </a:xfrm>
+          <a:prstGeom prst="rect">
+            <a:avLst/>
+          </a:prstGeom>
+        </p:spPr>
+      </p:pic>
+      <p:sp>
+        <p:nvSpPr>
+          <p:cNvPr id="30" name="Shape 1226"/>
+          <p:cNvSpPr txBox="1"/>
+          <p:nvPr/>
+        </p:nvSpPr>
+        <p:spPr>
+          <a:xfrm rot="21597370">
+            <a:off x="5112912" y="4738500"/>
+            <a:ext cx="784200" cy="333600"/>
+          </a:xfrm>
+          <a:prstGeom prst="rect">
+            <a:avLst/>
+          </a:prstGeom>
+          <a:noFill/>
+          <a:ln>
+            <a:noFill/>
+          </a:ln>
+        </p:spPr>
+        <p:txBody>
+          <a:bodyPr lIns="91425" tIns="91425" rIns="91425" bIns="91425" anchor="t" anchorCtr="0">
+            <a:noAutofit/>
+          </a:bodyPr>
+          <a:lstStyle/>
+          <a:p>
+            <a:pPr lvl="0" rtl="0">
+              <a:spcBef>
+                <a:spcPts val="0"/>
+              </a:spcBef>
+              <a:buNone/>
+            </a:pPr>
+            <a:r>
+              <a:rPr lang="en-US" sz="1200" b="1" dirty="0" smtClean="0">
+                <a:solidFill>
+                  <a:srgbClr val="351C75"/>
+                </a:solidFill>
+              </a:rPr>
+              <a:t>AC/AS</a:t>
+            </a:r>
+            <a:endParaRPr lang="en" sz="1200" b="1" dirty="0">
+              <a:solidFill>
+                <a:srgbClr val="351C75"/>
+              </a:solidFill>
+            </a:endParaRPr>
+          </a:p>
+        </p:txBody>
+      </p:sp>
+      <p:sp>
+        <p:nvSpPr>
+          <p:cNvPr id="19" name="Shape 1228"/>
+          <p:cNvSpPr/>
+          <p:nvPr/>
+        </p:nvSpPr>
+        <p:spPr>
+          <a:xfrm>
+            <a:off x="107511" y="3404950"/>
+            <a:ext cx="1360886" cy="437700"/>
+          </a:xfrm>
+          <a:prstGeom prst="wedgeRectCallout">
+            <a:avLst>
+              <a:gd name="adj1" fmla="val 11974"/>
+              <a:gd name="adj2" fmla="val 107100"/>
+            </a:avLst>
+          </a:prstGeom>
+          <a:solidFill>
+            <a:srgbClr val="990000"/>
+          </a:solidFill>
+          <a:ln w="9525" cap="flat" cmpd="sng">
+            <a:solidFill>
+              <a:srgbClr val="660000"/>
+            </a:solidFill>
+            <a:prstDash val="solid"/>
+            <a:round/>
+            <a:headEnd type="none" w="med" len="med"/>
+            <a:tailEnd type="none" w="med" len="med"/>
+          </a:ln>
+        </p:spPr>
+        <p:txBody>
+          <a:bodyPr lIns="91425" tIns="91425" rIns="91425" bIns="91425" anchor="ctr" anchorCtr="0">
+            <a:noAutofit/>
+          </a:bodyPr>
+          <a:lstStyle/>
+          <a:p>
+            <a:pPr marL="0" marR="0" lvl="0" indent="0" algn="ctr" rtl="0">
+              <a:lnSpc>
+                <a:spcPct val="100000"/>
+              </a:lnSpc>
+              <a:spcBef>
+                <a:spcPts val="0"/>
+              </a:spcBef>
+              <a:spcAft>
+                <a:spcPts val="0"/>
+              </a:spcAft>
+              <a:buNone/>
+            </a:pPr>
+            <a:r>
+              <a:rPr lang="en-US" sz="1200" dirty="0" smtClean="0">
+                <a:solidFill>
+                  <a:schemeClr val="lt1"/>
+                </a:solidFill>
+              </a:rPr>
+              <a:t>Listening for D2D devices</a:t>
+            </a:r>
+            <a:r>
+              <a:rPr lang="is-IS" sz="1200" dirty="0" smtClean="0">
+                <a:solidFill>
+                  <a:schemeClr val="lt1"/>
+                </a:solidFill>
+              </a:rPr>
+              <a:t>…</a:t>
+            </a:r>
+            <a:endParaRPr lang="en" sz="1200" dirty="0">
+              <a:solidFill>
+                <a:schemeClr val="lt1"/>
+              </a:solidFill>
+            </a:endParaRPr>
+          </a:p>
+        </p:txBody>
+      </p:sp>
+      <p:sp>
+        <p:nvSpPr>
+          <p:cNvPr id="21" name="Shape 1228"/>
+          <p:cNvSpPr/>
+          <p:nvPr/>
+        </p:nvSpPr>
+        <p:spPr>
+          <a:xfrm>
+            <a:off x="5216797" y="3338500"/>
+            <a:ext cx="1360886" cy="437700"/>
+          </a:xfrm>
+          <a:prstGeom prst="wedgeRectCallout">
+            <a:avLst>
+              <a:gd name="adj1" fmla="val -38420"/>
+              <a:gd name="adj2" fmla="val 80986"/>
+            </a:avLst>
+          </a:prstGeom>
+          <a:solidFill>
+            <a:srgbClr val="990000"/>
+          </a:solidFill>
+          <a:ln w="9525" cap="flat" cmpd="sng">
+            <a:solidFill>
+              <a:srgbClr val="660000"/>
+            </a:solidFill>
+            <a:prstDash val="solid"/>
+            <a:round/>
+            <a:headEnd type="none" w="med" len="med"/>
+            <a:tailEnd type="none" w="med" len="med"/>
+          </a:ln>
+        </p:spPr>
+        <p:txBody>
+          <a:bodyPr lIns="91425" tIns="91425" rIns="91425" bIns="91425" anchor="ctr" anchorCtr="0">
+            <a:noAutofit/>
+          </a:bodyPr>
+          <a:lstStyle/>
+          <a:p>
+            <a:pPr marL="0" marR="0" lvl="0" indent="0" algn="ctr" rtl="0">
+              <a:lnSpc>
+                <a:spcPct val="100000"/>
+              </a:lnSpc>
+              <a:spcBef>
+                <a:spcPts val="0"/>
+              </a:spcBef>
+              <a:spcAft>
+                <a:spcPts val="0"/>
+              </a:spcAft>
+              <a:buNone/>
+            </a:pPr>
+            <a:r>
+              <a:rPr lang="en-US" sz="1200" dirty="0" smtClean="0">
+                <a:solidFill>
+                  <a:schemeClr val="lt1"/>
+                </a:solidFill>
+              </a:rPr>
+              <a:t>Broadcasting</a:t>
+            </a:r>
+            <a:r>
+              <a:rPr lang="is-IS" sz="1200" dirty="0" smtClean="0">
+                <a:solidFill>
+                  <a:schemeClr val="lt1"/>
+                </a:solidFill>
+              </a:rPr>
+              <a:t>…</a:t>
+            </a:r>
+            <a:endParaRPr lang="en" sz="1200" dirty="0">
+              <a:solidFill>
+                <a:schemeClr val="lt1"/>
+              </a:solidFill>
+            </a:endParaRPr>
+          </a:p>
+        </p:txBody>
+      </p:sp>
+      <p:sp>
+        <p:nvSpPr>
+          <p:cNvPr id="31" name="Shape 1228"/>
+          <p:cNvSpPr/>
+          <p:nvPr/>
+        </p:nvSpPr>
+        <p:spPr>
+          <a:xfrm>
+            <a:off x="1468397" y="4853550"/>
+            <a:ext cx="1046203" cy="437700"/>
+          </a:xfrm>
+          <a:prstGeom prst="wedgeRectCallout">
+            <a:avLst>
+              <a:gd name="adj1" fmla="val -68283"/>
+              <a:gd name="adj2" fmla="val -145333"/>
+            </a:avLst>
+          </a:prstGeom>
+          <a:solidFill>
+            <a:srgbClr val="990000"/>
+          </a:solidFill>
+          <a:ln w="9525" cap="flat" cmpd="sng">
+            <a:solidFill>
+              <a:srgbClr val="660000"/>
+            </a:solidFill>
+            <a:prstDash val="solid"/>
+            <a:round/>
+            <a:headEnd type="none" w="med" len="med"/>
+            <a:tailEnd type="none" w="med" len="med"/>
+          </a:ln>
+        </p:spPr>
+        <p:txBody>
+          <a:bodyPr lIns="91425" tIns="91425" rIns="91425" bIns="91425" anchor="ctr" anchorCtr="0">
+            <a:noAutofit/>
+          </a:bodyPr>
+          <a:lstStyle/>
+          <a:p>
+            <a:pPr marL="0" marR="0" lvl="0" indent="0" algn="ctr" rtl="0">
+              <a:lnSpc>
+                <a:spcPct val="100000"/>
+              </a:lnSpc>
+              <a:spcBef>
+                <a:spcPts val="0"/>
+              </a:spcBef>
+              <a:spcAft>
+                <a:spcPts val="0"/>
+              </a:spcAft>
+              <a:buNone/>
+            </a:pPr>
+            <a:r>
+              <a:rPr lang="en-US" sz="1200" dirty="0" smtClean="0">
+                <a:solidFill>
+                  <a:schemeClr val="lt1"/>
+                </a:solidFill>
+              </a:rPr>
+              <a:t>Received!</a:t>
+            </a:r>
+            <a:endParaRPr lang="en" sz="1200" dirty="0">
+              <a:solidFill>
+                <a:schemeClr val="lt1"/>
+              </a:solidFill>
+            </a:endParaRPr>
+          </a:p>
+        </p:txBody>
+      </p:sp>
+    </p:spTree>
+    <p:extLst>
+      <p:ext uri="{BB962C8B-B14F-4D97-AF65-F5344CB8AC3E}">
+        <p14:creationId xmlns:p14="http://schemas.microsoft.com/office/powerpoint/2010/main" val="3698029572"/>
+      </p:ext>
+    </p:extLst>
+  </p:cSld>
+  <p:clrMapOvr>
+    <a:masterClrMapping/>
+  </p:clrMapOvr>
+</p:sld>
+</file>
+
+<file path=ppt/slides/slide59.xml><?xml version="1.0" encoding="utf-8"?>
+<p:sld xmlns:a="http://schemas.openxmlformats.org/drawingml/2006/main" xmlns:r="http://schemas.openxmlformats.org/officeDocument/2006/relationships" xmlns:p="http://schemas.openxmlformats.org/presentationml/2006/main">
+  <p:cSld>
+    <p:spTree>
+      <p:nvGrpSpPr>
+        <p:cNvPr id="1" name="Shape 1216"/>
+        <p:cNvGrpSpPr/>
+        <p:nvPr/>
+      </p:nvGrpSpPr>
+      <p:grpSpPr>
+        <a:xfrm>
+          <a:off x="0" y="0"/>
+          <a:ext cx="0" cy="0"/>
+          <a:chOff x="0" y="0"/>
+          <a:chExt cx="0" cy="0"/>
+        </a:xfrm>
+      </p:grpSpPr>
+      <p:pic>
+        <p:nvPicPr>
+          <p:cNvPr id="3" name="Picture 2"/>
+          <p:cNvPicPr>
+            <a:picLocks noChangeAspect="1"/>
+          </p:cNvPicPr>
+          <p:nvPr/>
+        </p:nvPicPr>
+        <p:blipFill>
+          <a:blip r:embed="rId3"/>
+          <a:stretch>
+            <a:fillRect/>
+          </a:stretch>
+        </p:blipFill>
+        <p:spPr>
+          <a:xfrm>
+            <a:off x="2761918" y="3036621"/>
+            <a:ext cx="902179" cy="902179"/>
+          </a:xfrm>
+          <a:prstGeom prst="rect">
+            <a:avLst/>
+          </a:prstGeom>
+        </p:spPr>
+      </p:pic>
+      <p:grpSp>
+        <p:nvGrpSpPr>
+          <p:cNvPr id="23" name="Group 22"/>
+          <p:cNvGrpSpPr/>
+          <p:nvPr/>
+        </p:nvGrpSpPr>
+        <p:grpSpPr>
+          <a:xfrm>
+            <a:off x="3834904" y="1753293"/>
+            <a:ext cx="2287095" cy="1345507"/>
+            <a:chOff x="3834904" y="1753293"/>
+            <a:chExt cx="2287095" cy="1345507"/>
+          </a:xfrm>
+        </p:grpSpPr>
+        <p:grpSp>
+          <p:nvGrpSpPr>
+            <p:cNvPr id="24" name="Group 23"/>
+            <p:cNvGrpSpPr/>
+            <p:nvPr/>
+          </p:nvGrpSpPr>
+          <p:grpSpPr>
+            <a:xfrm>
+              <a:off x="3834904" y="1753293"/>
+              <a:ext cx="2287095" cy="1345507"/>
+              <a:chOff x="3834904" y="1753293"/>
+              <a:chExt cx="2287095" cy="1345507"/>
+            </a:xfrm>
+          </p:grpSpPr>
+          <p:sp>
+            <p:nvSpPr>
+              <p:cNvPr id="26" name="Cloud 25"/>
+              <p:cNvSpPr/>
+              <p:nvPr/>
+            </p:nvSpPr>
+            <p:spPr>
+              <a:xfrm>
+                <a:off x="3834904" y="1753293"/>
+                <a:ext cx="2015480" cy="1345507"/>
+              </a:xfrm>
+              <a:prstGeom prst="cloud">
+                <a:avLst/>
+              </a:prstGeom>
+              <a:gradFill flip="none" rotWithShape="1">
+                <a:gsLst>
+                  <a:gs pos="0">
+                    <a:srgbClr val="D16349">
+                      <a:shade val="15000"/>
+                      <a:satMod val="180000"/>
+                      <a:alpha val="73000"/>
+                    </a:srgbClr>
+                  </a:gs>
+                  <a:gs pos="50000">
+                    <a:srgbClr val="D16349">
+                      <a:shade val="45000"/>
+                      <a:satMod val="170000"/>
+                      <a:alpha val="73000"/>
+                    </a:srgbClr>
+                  </a:gs>
+                  <a:gs pos="70000">
+                    <a:srgbClr val="D16349">
+                      <a:tint val="99000"/>
+                      <a:shade val="65000"/>
+                      <a:satMod val="155000"/>
+                      <a:alpha val="73000"/>
+                    </a:srgbClr>
+                  </a:gs>
+                  <a:gs pos="100000">
+                    <a:srgbClr val="D16349">
+                      <a:tint val="95500"/>
+                      <a:shade val="100000"/>
+                      <a:satMod val="155000"/>
+                      <a:alpha val="73000"/>
+                    </a:srgbClr>
+                  </a:gs>
+                </a:gsLst>
+                <a:lin ang="16200000" scaled="0"/>
+                <a:tileRect/>
+              </a:gradFill>
+              <a:ln w="9525" cap="flat" cmpd="sng" algn="ctr">
+                <a:solidFill>
+                  <a:srgbClr val="D16349"/>
+                </a:solidFill>
+                <a:prstDash val="solid"/>
+              </a:ln>
+              <a:effectLst>
+                <a:outerShdw blurRad="50800" dist="38100" dir="5400000" rotWithShape="0">
+                  <a:srgbClr val="000000">
+                    <a:alpha val="35000"/>
+                  </a:srgbClr>
+                </a:outerShdw>
+              </a:effectLst>
+            </p:spPr>
+            <p:txBody>
+              <a:bodyPr rtlCol="0" anchor="ctr"/>
+              <a:lstStyle/>
+              <a:p>
+                <a:pPr marL="0" marR="0" lvl="0" indent="0" algn="ctr" defTabSz="914400" eaLnBrk="1" fontAlgn="auto" latinLnBrk="0" hangingPunct="1">
+                  <a:lnSpc>
+                    <a:spcPct val="100000"/>
+                  </a:lnSpc>
+                  <a:spcBef>
+                    <a:spcPts val="0"/>
+                  </a:spcBef>
+                  <a:spcAft>
+                    <a:spcPts val="0"/>
+                  </a:spcAft>
+                  <a:buClrTx/>
+                  <a:buSzTx/>
+                  <a:buFontTx/>
+                  <a:buNone/>
+                  <a:tabLst/>
+                  <a:defRPr/>
+                </a:pPr>
+                <a:endParaRPr kumimoji="0" lang="en-US" sz="1800" b="0" i="0" u="none" strike="noStrike" kern="0" cap="none" spc="0" normalizeH="0" baseline="0" noProof="0">
+                  <a:ln>
+                    <a:noFill/>
+                  </a:ln>
+                  <a:solidFill>
+                    <a:sysClr val="window" lastClr="FFFFFF"/>
+                  </a:solidFill>
+                  <a:effectLst/>
+                  <a:uLnTx/>
+                  <a:uFillTx/>
+                  <a:latin typeface="Lucida Sans Unicode"/>
+                  <a:ea typeface="+mn-ea"/>
+                  <a:cs typeface="+mn-cs"/>
+                </a:endParaRPr>
+              </a:p>
+            </p:txBody>
+          </p:sp>
+          <p:pic>
+            <p:nvPicPr>
+              <p:cNvPr id="27" name="Picture 26"/>
+              <p:cNvPicPr>
+                <a:picLocks noChangeAspect="1"/>
+              </p:cNvPicPr>
+              <p:nvPr/>
+            </p:nvPicPr>
+            <p:blipFill>
+              <a:blip r:embed="rId4">
+                <a:alphaModFix amt="30000"/>
+              </a:blip>
+              <a:stretch>
+                <a:fillRect/>
+              </a:stretch>
+            </p:blipFill>
+            <p:spPr>
+              <a:xfrm>
+                <a:off x="4738264" y="1971848"/>
+                <a:ext cx="875136" cy="493814"/>
+              </a:xfrm>
+              <a:prstGeom prst="rect">
+                <a:avLst/>
+              </a:prstGeom>
+            </p:spPr>
+          </p:pic>
+          <p:sp>
+            <p:nvSpPr>
+              <p:cNvPr id="28" name="Shape 165"/>
+              <p:cNvSpPr txBox="1"/>
+              <p:nvPr/>
+            </p:nvSpPr>
+            <p:spPr>
+              <a:xfrm rot="-1650">
+                <a:off x="4842725" y="1959299"/>
+                <a:ext cx="625200" cy="333600"/>
+              </a:xfrm>
+              <a:prstGeom prst="rect">
+                <a:avLst/>
+              </a:prstGeom>
+              <a:noFill/>
+              <a:ln>
+                <a:noFill/>
+              </a:ln>
+            </p:spPr>
+            <p:txBody>
+              <a:bodyPr lIns="91425" tIns="91425" rIns="91425" bIns="91425" anchor="t" anchorCtr="0">
+                <a:noAutofit/>
+              </a:bodyPr>
+              <a:lstStyle/>
+              <a:p>
+                <a:pPr lvl="0" rtl="0">
+                  <a:spcBef>
+                    <a:spcPts val="0"/>
+                  </a:spcBef>
+                  <a:buNone/>
+                </a:pPr>
+                <a:r>
+                  <a:rPr lang="en" sz="1200" b="1">
+                    <a:solidFill>
+                      <a:srgbClr val="351C75"/>
+                    </a:solidFill>
+                  </a:rPr>
+                  <a:t>VMM</a:t>
+                </a:r>
+              </a:p>
+            </p:txBody>
+          </p:sp>
+          <p:sp>
+            <p:nvSpPr>
+              <p:cNvPr id="29" name="Shape 167"/>
+              <p:cNvSpPr txBox="1"/>
+              <p:nvPr/>
+            </p:nvSpPr>
+            <p:spPr>
+              <a:xfrm rot="-2329">
+                <a:off x="5236399" y="2373072"/>
+                <a:ext cx="885600" cy="523500"/>
+              </a:xfrm>
+              <a:prstGeom prst="rect">
+                <a:avLst/>
+              </a:prstGeom>
+              <a:noFill/>
+              <a:ln>
+                <a:noFill/>
+              </a:ln>
+            </p:spPr>
+            <p:txBody>
+              <a:bodyPr lIns="91425" tIns="91425" rIns="91425" bIns="91425" anchor="t" anchorCtr="0">
+                <a:noAutofit/>
+              </a:bodyPr>
+              <a:lstStyle/>
+              <a:p>
+                <a:pPr lvl="0" rtl="0">
+                  <a:spcBef>
+                    <a:spcPts val="0"/>
+                  </a:spcBef>
+                  <a:buNone/>
+                </a:pPr>
+                <a:r>
+                  <a:rPr lang="en" sz="1200" b="1">
+                    <a:solidFill>
+                      <a:srgbClr val="351C75"/>
+                    </a:solidFill>
+                  </a:rPr>
+                  <a:t>Physical Machine</a:t>
+                </a:r>
+              </a:p>
+            </p:txBody>
+          </p:sp>
+        </p:grpSp>
+        <p:pic>
+          <p:nvPicPr>
+            <p:cNvPr id="25" name="Picture 24"/>
+            <p:cNvPicPr>
+              <a:picLocks noChangeAspect="1"/>
+            </p:cNvPicPr>
+            <p:nvPr/>
+          </p:nvPicPr>
+          <p:blipFill>
+            <a:blip r:embed="rId5">
+              <a:alphaModFix amt="30000"/>
+            </a:blip>
+            <a:stretch>
+              <a:fillRect/>
+            </a:stretch>
+          </p:blipFill>
+          <p:spPr>
+            <a:xfrm>
+              <a:off x="4230074" y="2360072"/>
+              <a:ext cx="380054" cy="453954"/>
+            </a:xfrm>
+            <a:prstGeom prst="rect">
+              <a:avLst/>
+            </a:prstGeom>
+          </p:spPr>
+        </p:pic>
+      </p:grpSp>
+      <p:sp>
+        <p:nvSpPr>
+          <p:cNvPr id="1221" name="Shape 1221"/>
+          <p:cNvSpPr txBox="1"/>
+          <p:nvPr/>
+        </p:nvSpPr>
+        <p:spPr>
+          <a:xfrm rot="-2332">
+            <a:off x="1468511" y="1243554"/>
+            <a:ext cx="442200" cy="333600"/>
+          </a:xfrm>
+          <a:prstGeom prst="rect">
+            <a:avLst/>
+          </a:prstGeom>
+          <a:noFill/>
+          <a:ln>
+            <a:noFill/>
+          </a:ln>
+        </p:spPr>
+        <p:txBody>
+          <a:bodyPr lIns="91425" tIns="91425" rIns="91425" bIns="91425" anchor="t" anchorCtr="0">
+            <a:noAutofit/>
+          </a:bodyPr>
+          <a:lstStyle/>
+          <a:p>
+            <a:pPr lvl="0" rtl="0">
+              <a:spcBef>
+                <a:spcPts val="0"/>
+              </a:spcBef>
+              <a:buNone/>
+            </a:pPr>
+            <a:r>
+              <a:rPr lang="en" sz="1200" b="1">
+                <a:solidFill>
+                  <a:srgbClr val="351C75"/>
+                </a:solidFill>
+              </a:rPr>
+              <a:t>DS</a:t>
+            </a:r>
+          </a:p>
+        </p:txBody>
+      </p:sp>
+      <p:sp>
+        <p:nvSpPr>
+          <p:cNvPr id="1223" name="Shape 1223"/>
+          <p:cNvSpPr txBox="1"/>
+          <p:nvPr/>
+        </p:nvSpPr>
+        <p:spPr>
+          <a:xfrm rot="-3033">
+            <a:off x="3213156" y="162586"/>
+            <a:ext cx="680100" cy="333600"/>
+          </a:xfrm>
+          <a:prstGeom prst="rect">
+            <a:avLst/>
+          </a:prstGeom>
+          <a:noFill/>
+          <a:ln>
+            <a:noFill/>
+          </a:ln>
+        </p:spPr>
+        <p:txBody>
+          <a:bodyPr lIns="91425" tIns="91425" rIns="91425" bIns="91425" anchor="t" anchorCtr="0">
+            <a:noAutofit/>
+          </a:bodyPr>
+          <a:lstStyle/>
+          <a:p>
+            <a:pPr lvl="0" rtl="0">
+              <a:spcBef>
+                <a:spcPts val="0"/>
+              </a:spcBef>
+              <a:buNone/>
+            </a:pPr>
+            <a:r>
+              <a:rPr lang="en" sz="1200" b="1">
+                <a:solidFill>
+                  <a:srgbClr val="351C75"/>
+                </a:solidFill>
+              </a:rPr>
+              <a:t>SLAM</a:t>
+            </a:r>
+          </a:p>
+        </p:txBody>
+      </p:sp>
+      <p:sp>
+        <p:nvSpPr>
+          <p:cNvPr id="1224" name="Shape 1224"/>
+          <p:cNvSpPr txBox="1"/>
+          <p:nvPr/>
+        </p:nvSpPr>
+        <p:spPr>
+          <a:xfrm rot="-2329">
+            <a:off x="5236399" y="2373072"/>
+            <a:ext cx="885600" cy="523500"/>
+          </a:xfrm>
+          <a:prstGeom prst="rect">
+            <a:avLst/>
+          </a:prstGeom>
+          <a:noFill/>
+          <a:ln>
+            <a:noFill/>
+          </a:ln>
+        </p:spPr>
+        <p:txBody>
+          <a:bodyPr lIns="91425" tIns="91425" rIns="91425" bIns="91425" anchor="t" anchorCtr="0">
+            <a:noAutofit/>
+          </a:bodyPr>
+          <a:lstStyle/>
+          <a:p>
+            <a:pPr lvl="0" rtl="0">
+              <a:spcBef>
+                <a:spcPts val="0"/>
+              </a:spcBef>
+              <a:buNone/>
+            </a:pPr>
+            <a:r>
+              <a:rPr lang="en" sz="1200" b="1">
+                <a:solidFill>
+                  <a:srgbClr val="351C75"/>
+                </a:solidFill>
+              </a:rPr>
+              <a:t>Physical Machine</a:t>
+            </a:r>
+          </a:p>
+        </p:txBody>
+      </p:sp>
+      <p:pic>
+        <p:nvPicPr>
+          <p:cNvPr id="1225" name="Shape 1225" descr="Untitled.png"/>
+          <p:cNvPicPr preferRelativeResize="0"/>
+          <p:nvPr/>
+        </p:nvPicPr>
+        <p:blipFill>
+          <a:blip r:embed="rId6">
+            <a:alphaModFix/>
+          </a:blip>
+          <a:stretch>
+            <a:fillRect/>
+          </a:stretch>
+        </p:blipFill>
+        <p:spPr>
+          <a:xfrm>
+            <a:off x="925600" y="4075700"/>
+            <a:ext cx="245601" cy="602400"/>
+          </a:xfrm>
+          <a:prstGeom prst="rect">
+            <a:avLst/>
+          </a:prstGeom>
+          <a:noFill/>
+          <a:ln>
+            <a:noFill/>
+          </a:ln>
+        </p:spPr>
+      </p:pic>
+      <p:sp>
+        <p:nvSpPr>
+          <p:cNvPr id="1226" name="Shape 1226"/>
+          <p:cNvSpPr txBox="1"/>
+          <p:nvPr/>
+        </p:nvSpPr>
+        <p:spPr>
+          <a:xfrm rot="-2630">
+            <a:off x="771253" y="4621351"/>
+            <a:ext cx="784200" cy="333600"/>
+          </a:xfrm>
+          <a:prstGeom prst="rect">
+            <a:avLst/>
+          </a:prstGeom>
+          <a:noFill/>
+          <a:ln>
+            <a:noFill/>
+          </a:ln>
+        </p:spPr>
+        <p:txBody>
+          <a:bodyPr lIns="91425" tIns="91425" rIns="91425" bIns="91425" anchor="t" anchorCtr="0">
+            <a:noAutofit/>
+          </a:bodyPr>
+          <a:lstStyle/>
+          <a:p>
+            <a:pPr lvl="0" rtl="0">
+              <a:spcBef>
+                <a:spcPts val="0"/>
+              </a:spcBef>
+              <a:buNone/>
+            </a:pPr>
+            <a:r>
+              <a:rPr lang="en" sz="1200" b="1">
+                <a:solidFill>
+                  <a:srgbClr val="351C75"/>
+                </a:solidFill>
+              </a:rPr>
+              <a:t>Client</a:t>
+            </a:r>
+          </a:p>
+        </p:txBody>
+      </p:sp>
+      <p:pic>
+        <p:nvPicPr>
+          <p:cNvPr id="20" name="Picture 19"/>
+          <p:cNvPicPr>
+            <a:picLocks noChangeAspect="1"/>
+          </p:cNvPicPr>
+          <p:nvPr/>
+        </p:nvPicPr>
+        <p:blipFill>
+          <a:blip r:embed="rId7">
+            <a:alphaModFix amt="30000"/>
+          </a:blip>
+          <a:stretch>
+            <a:fillRect/>
+          </a:stretch>
+        </p:blipFill>
+        <p:spPr>
+          <a:xfrm>
+            <a:off x="1335856" y="1502300"/>
+            <a:ext cx="375208" cy="526889"/>
+          </a:xfrm>
+          <a:prstGeom prst="rect">
+            <a:avLst/>
+          </a:prstGeom>
+          <a:ln>
+            <a:noFill/>
+          </a:ln>
+          <a:effectLst>
+            <a:outerShdw blurRad="292100" dist="139700" dir="2700000" algn="tl" rotWithShape="0">
+              <a:srgbClr val="333333">
+                <a:alpha val="65000"/>
+              </a:srgbClr>
+            </a:outerShdw>
+          </a:effectLst>
+        </p:spPr>
+      </p:pic>
+      <p:pic>
+        <p:nvPicPr>
+          <p:cNvPr id="22" name="Picture 21" descr="service-_level-agreement.png"/>
+          <p:cNvPicPr>
+            <a:picLocks noChangeAspect="1"/>
+          </p:cNvPicPr>
+          <p:nvPr/>
+        </p:nvPicPr>
+        <p:blipFill rotWithShape="1">
+          <a:blip r:embed="rId8">
+            <a:alphaModFix amt="30000"/>
+            <a:extLst>
+              <a:ext uri="{28A0092B-C50C-407E-A947-70E740481C1C}">
+                <a14:useLocalDpi xmlns:a14="http://schemas.microsoft.com/office/drawing/2010/main" val="0"/>
+              </a:ext>
+            </a:extLst>
+          </a:blip>
+          <a:srcRect l="24058" t="14272" r="19175" b="16715"/>
+          <a:stretch/>
+        </p:blipFill>
+        <p:spPr>
+          <a:xfrm>
+            <a:off x="3325523" y="413792"/>
+            <a:ext cx="411772" cy="500608"/>
+          </a:xfrm>
+          <a:prstGeom prst="rect">
+            <a:avLst/>
+          </a:prstGeom>
+        </p:spPr>
+      </p:pic>
+      <p:pic>
+        <p:nvPicPr>
+          <p:cNvPr id="2" name="Picture 1"/>
+          <p:cNvPicPr>
+            <a:picLocks noChangeAspect="1"/>
+          </p:cNvPicPr>
+          <p:nvPr/>
+        </p:nvPicPr>
+        <p:blipFill rotWithShape="1">
+          <a:blip r:embed="rId9"/>
+          <a:srcRect l="35334" t="11001" r="32333" b="10786"/>
+          <a:stretch/>
+        </p:blipFill>
+        <p:spPr>
+          <a:xfrm>
+            <a:off x="5236221" y="3907040"/>
+            <a:ext cx="381000" cy="921625"/>
+          </a:xfrm>
+          <a:prstGeom prst="rect">
+            <a:avLst/>
+          </a:prstGeom>
+        </p:spPr>
+      </p:pic>
+      <p:sp>
+        <p:nvSpPr>
+          <p:cNvPr id="30" name="Shape 1226"/>
+          <p:cNvSpPr txBox="1"/>
+          <p:nvPr/>
+        </p:nvSpPr>
+        <p:spPr>
+          <a:xfrm rot="21597370">
+            <a:off x="5112912" y="4738500"/>
+            <a:ext cx="784200" cy="333600"/>
+          </a:xfrm>
+          <a:prstGeom prst="rect">
+            <a:avLst/>
+          </a:prstGeom>
+          <a:noFill/>
+          <a:ln>
+            <a:noFill/>
+          </a:ln>
+        </p:spPr>
+        <p:txBody>
+          <a:bodyPr lIns="91425" tIns="91425" rIns="91425" bIns="91425" anchor="t" anchorCtr="0">
+            <a:noAutofit/>
+          </a:bodyPr>
+          <a:lstStyle/>
+          <a:p>
+            <a:pPr lvl="0" rtl="0">
+              <a:spcBef>
+                <a:spcPts val="0"/>
+              </a:spcBef>
+              <a:buNone/>
+            </a:pPr>
+            <a:r>
+              <a:rPr lang="en-US" sz="1200" b="1" dirty="0" smtClean="0">
+                <a:solidFill>
+                  <a:srgbClr val="351C75"/>
+                </a:solidFill>
+              </a:rPr>
+              <a:t>AC/AS</a:t>
+            </a:r>
+            <a:endParaRPr lang="en" sz="1200" b="1" dirty="0">
+              <a:solidFill>
+                <a:srgbClr val="351C75"/>
+              </a:solidFill>
+            </a:endParaRPr>
+          </a:p>
+        </p:txBody>
+      </p:sp>
+      <p:sp>
+        <p:nvSpPr>
+          <p:cNvPr id="19" name="Shape 1228"/>
+          <p:cNvSpPr/>
+          <p:nvPr/>
+        </p:nvSpPr>
+        <p:spPr>
+          <a:xfrm>
+            <a:off x="107511" y="3404950"/>
+            <a:ext cx="1360886" cy="437700"/>
+          </a:xfrm>
+          <a:prstGeom prst="wedgeRectCallout">
+            <a:avLst>
+              <a:gd name="adj1" fmla="val 11974"/>
+              <a:gd name="adj2" fmla="val 107100"/>
+            </a:avLst>
+          </a:prstGeom>
+          <a:solidFill>
+            <a:srgbClr val="990000"/>
+          </a:solidFill>
+          <a:ln w="9525" cap="flat" cmpd="sng">
+            <a:solidFill>
+              <a:srgbClr val="660000"/>
+            </a:solidFill>
+            <a:prstDash val="solid"/>
+            <a:round/>
+            <a:headEnd type="none" w="med" len="med"/>
+            <a:tailEnd type="none" w="med" len="med"/>
+          </a:ln>
+        </p:spPr>
+        <p:txBody>
+          <a:bodyPr lIns="91425" tIns="91425" rIns="91425" bIns="91425" anchor="ctr" anchorCtr="0">
+            <a:noAutofit/>
+          </a:bodyPr>
+          <a:lstStyle/>
+          <a:p>
+            <a:pPr marL="0" marR="0" lvl="0" indent="0" algn="ctr" rtl="0">
+              <a:lnSpc>
+                <a:spcPct val="100000"/>
+              </a:lnSpc>
+              <a:spcBef>
+                <a:spcPts val="0"/>
+              </a:spcBef>
+              <a:spcAft>
+                <a:spcPts val="0"/>
+              </a:spcAft>
+              <a:buNone/>
+            </a:pPr>
+            <a:r>
+              <a:rPr lang="en-US" sz="1200" dirty="0" smtClean="0">
+                <a:solidFill>
+                  <a:schemeClr val="lt1"/>
+                </a:solidFill>
+              </a:rPr>
+              <a:t>Listening for D2D devices</a:t>
+            </a:r>
+            <a:r>
+              <a:rPr lang="is-IS" sz="1200" dirty="0" smtClean="0">
+                <a:solidFill>
+                  <a:schemeClr val="lt1"/>
+                </a:solidFill>
+              </a:rPr>
+              <a:t>…</a:t>
+            </a:r>
+            <a:endParaRPr lang="en" sz="1200" dirty="0">
+              <a:solidFill>
+                <a:schemeClr val="lt1"/>
+              </a:solidFill>
+            </a:endParaRPr>
+          </a:p>
+        </p:txBody>
+      </p:sp>
+      <p:sp>
+        <p:nvSpPr>
+          <p:cNvPr id="32" name="Shape 1228"/>
+          <p:cNvSpPr/>
+          <p:nvPr/>
+        </p:nvSpPr>
+        <p:spPr>
+          <a:xfrm>
+            <a:off x="5216797" y="3338500"/>
+            <a:ext cx="1360886" cy="437700"/>
+          </a:xfrm>
+          <a:prstGeom prst="wedgeRectCallout">
+            <a:avLst>
+              <a:gd name="adj1" fmla="val -38420"/>
+              <a:gd name="adj2" fmla="val 80986"/>
+            </a:avLst>
+          </a:prstGeom>
+          <a:solidFill>
+            <a:srgbClr val="990000"/>
+          </a:solidFill>
+          <a:ln w="9525" cap="flat" cmpd="sng">
+            <a:solidFill>
+              <a:srgbClr val="660000"/>
+            </a:solidFill>
+            <a:prstDash val="solid"/>
+            <a:round/>
+            <a:headEnd type="none" w="med" len="med"/>
+            <a:tailEnd type="none" w="med" len="med"/>
+          </a:ln>
+        </p:spPr>
+        <p:txBody>
+          <a:bodyPr lIns="91425" tIns="91425" rIns="91425" bIns="91425" anchor="ctr" anchorCtr="0">
+            <a:noAutofit/>
+          </a:bodyPr>
+          <a:lstStyle/>
+          <a:p>
+            <a:pPr marL="0" marR="0" lvl="0" indent="0" algn="ctr" rtl="0">
+              <a:lnSpc>
+                <a:spcPct val="100000"/>
+              </a:lnSpc>
+              <a:spcBef>
+                <a:spcPts val="0"/>
+              </a:spcBef>
+              <a:spcAft>
+                <a:spcPts val="0"/>
+              </a:spcAft>
+              <a:buNone/>
+            </a:pPr>
+            <a:r>
+              <a:rPr lang="en-US" sz="1200" dirty="0" smtClean="0">
+                <a:solidFill>
+                  <a:schemeClr val="lt1"/>
+                </a:solidFill>
+              </a:rPr>
+              <a:t>Broadcasting</a:t>
+            </a:r>
+            <a:r>
+              <a:rPr lang="is-IS" sz="1200" dirty="0" smtClean="0">
+                <a:solidFill>
+                  <a:schemeClr val="lt1"/>
+                </a:solidFill>
+              </a:rPr>
+              <a:t>…</a:t>
+            </a:r>
+            <a:endParaRPr lang="en" sz="1200" dirty="0">
+              <a:solidFill>
+                <a:schemeClr val="lt1"/>
+              </a:solidFill>
+            </a:endParaRPr>
+          </a:p>
+        </p:txBody>
+      </p:sp>
+    </p:spTree>
+    <p:extLst>
+      <p:ext uri="{BB962C8B-B14F-4D97-AF65-F5344CB8AC3E}">
+        <p14:creationId xmlns:p14="http://schemas.microsoft.com/office/powerpoint/2010/main" val="2654027921"/>
+      </p:ext>
+    </p:extLst>
+  </p:cSld>
+  <p:clrMapOvr>
+    <a:masterClrMapping/>
+  </p:clrMapOvr>
+</p:sld>
+</file>
+
 <file path=ppt/slides/slide6.xml><?xml version="1.0" encoding="utf-8"?>
 <p:sld xmlns:a="http://schemas.openxmlformats.org/drawingml/2006/main" xmlns:r="http://schemas.openxmlformats.org/officeDocument/2006/relationships" xmlns:p="http://schemas.openxmlformats.org/presentationml/2006/main">
   <p:cSld>
@@ -60133,6 +62209,1386 @@
       </p:par>
     </p:tnLst>
   </p:timing>
+</p:sld>
+</file>
+
+<file path=ppt/slides/slide60.xml><?xml version="1.0" encoding="utf-8"?>
+<p:sld xmlns:a="http://schemas.openxmlformats.org/drawingml/2006/main" xmlns:r="http://schemas.openxmlformats.org/officeDocument/2006/relationships" xmlns:p="http://schemas.openxmlformats.org/presentationml/2006/main">
+  <p:cSld>
+    <p:spTree>
+      <p:nvGrpSpPr>
+        <p:cNvPr id="1" name="Shape 1216"/>
+        <p:cNvGrpSpPr/>
+        <p:nvPr/>
+      </p:nvGrpSpPr>
+      <p:grpSpPr>
+        <a:xfrm>
+          <a:off x="0" y="0"/>
+          <a:ext cx="0" cy="0"/>
+          <a:chOff x="0" y="0"/>
+          <a:chExt cx="0" cy="0"/>
+        </a:xfrm>
+      </p:grpSpPr>
+      <p:pic>
+        <p:nvPicPr>
+          <p:cNvPr id="3" name="Picture 2"/>
+          <p:cNvPicPr>
+            <a:picLocks noChangeAspect="1"/>
+          </p:cNvPicPr>
+          <p:nvPr/>
+        </p:nvPicPr>
+        <p:blipFill>
+          <a:blip r:embed="rId3"/>
+          <a:stretch>
+            <a:fillRect/>
+          </a:stretch>
+        </p:blipFill>
+        <p:spPr>
+          <a:xfrm>
+            <a:off x="2761918" y="3036621"/>
+            <a:ext cx="902179" cy="902179"/>
+          </a:xfrm>
+          <a:prstGeom prst="rect">
+            <a:avLst/>
+          </a:prstGeom>
+        </p:spPr>
+      </p:pic>
+      <p:grpSp>
+        <p:nvGrpSpPr>
+          <p:cNvPr id="23" name="Group 22"/>
+          <p:cNvGrpSpPr/>
+          <p:nvPr/>
+        </p:nvGrpSpPr>
+        <p:grpSpPr>
+          <a:xfrm>
+            <a:off x="3834904" y="1753293"/>
+            <a:ext cx="2287095" cy="1345507"/>
+            <a:chOff x="3834904" y="1753293"/>
+            <a:chExt cx="2287095" cy="1345507"/>
+          </a:xfrm>
+        </p:grpSpPr>
+        <p:grpSp>
+          <p:nvGrpSpPr>
+            <p:cNvPr id="24" name="Group 23"/>
+            <p:cNvGrpSpPr/>
+            <p:nvPr/>
+          </p:nvGrpSpPr>
+          <p:grpSpPr>
+            <a:xfrm>
+              <a:off x="3834904" y="1753293"/>
+              <a:ext cx="2287095" cy="1345507"/>
+              <a:chOff x="3834904" y="1753293"/>
+              <a:chExt cx="2287095" cy="1345507"/>
+            </a:xfrm>
+          </p:grpSpPr>
+          <p:sp>
+            <p:nvSpPr>
+              <p:cNvPr id="26" name="Cloud 25"/>
+              <p:cNvSpPr/>
+              <p:nvPr/>
+            </p:nvSpPr>
+            <p:spPr>
+              <a:xfrm>
+                <a:off x="3834904" y="1753293"/>
+                <a:ext cx="2015480" cy="1345507"/>
+              </a:xfrm>
+              <a:prstGeom prst="cloud">
+                <a:avLst/>
+              </a:prstGeom>
+              <a:gradFill flip="none" rotWithShape="1">
+                <a:gsLst>
+                  <a:gs pos="0">
+                    <a:srgbClr val="D16349">
+                      <a:shade val="15000"/>
+                      <a:satMod val="180000"/>
+                      <a:alpha val="73000"/>
+                    </a:srgbClr>
+                  </a:gs>
+                  <a:gs pos="50000">
+                    <a:srgbClr val="D16349">
+                      <a:shade val="45000"/>
+                      <a:satMod val="170000"/>
+                      <a:alpha val="73000"/>
+                    </a:srgbClr>
+                  </a:gs>
+                  <a:gs pos="70000">
+                    <a:srgbClr val="D16349">
+                      <a:tint val="99000"/>
+                      <a:shade val="65000"/>
+                      <a:satMod val="155000"/>
+                      <a:alpha val="73000"/>
+                    </a:srgbClr>
+                  </a:gs>
+                  <a:gs pos="100000">
+                    <a:srgbClr val="D16349">
+                      <a:tint val="95500"/>
+                      <a:shade val="100000"/>
+                      <a:satMod val="155000"/>
+                      <a:alpha val="73000"/>
+                    </a:srgbClr>
+                  </a:gs>
+                </a:gsLst>
+                <a:lin ang="16200000" scaled="0"/>
+                <a:tileRect/>
+              </a:gradFill>
+              <a:ln w="9525" cap="flat" cmpd="sng" algn="ctr">
+                <a:solidFill>
+                  <a:srgbClr val="D16349"/>
+                </a:solidFill>
+                <a:prstDash val="solid"/>
+              </a:ln>
+              <a:effectLst>
+                <a:outerShdw blurRad="50800" dist="38100" dir="5400000" rotWithShape="0">
+                  <a:srgbClr val="000000">
+                    <a:alpha val="35000"/>
+                  </a:srgbClr>
+                </a:outerShdw>
+              </a:effectLst>
+            </p:spPr>
+            <p:txBody>
+              <a:bodyPr rtlCol="0" anchor="ctr"/>
+              <a:lstStyle/>
+              <a:p>
+                <a:pPr marL="0" marR="0" lvl="0" indent="0" algn="ctr" defTabSz="914400" eaLnBrk="1" fontAlgn="auto" latinLnBrk="0" hangingPunct="1">
+                  <a:lnSpc>
+                    <a:spcPct val="100000"/>
+                  </a:lnSpc>
+                  <a:spcBef>
+                    <a:spcPts val="0"/>
+                  </a:spcBef>
+                  <a:spcAft>
+                    <a:spcPts val="0"/>
+                  </a:spcAft>
+                  <a:buClrTx/>
+                  <a:buSzTx/>
+                  <a:buFontTx/>
+                  <a:buNone/>
+                  <a:tabLst/>
+                  <a:defRPr/>
+                </a:pPr>
+                <a:endParaRPr kumimoji="0" lang="en-US" sz="1800" b="0" i="0" u="none" strike="noStrike" kern="0" cap="none" spc="0" normalizeH="0" baseline="0" noProof="0">
+                  <a:ln>
+                    <a:noFill/>
+                  </a:ln>
+                  <a:solidFill>
+                    <a:sysClr val="window" lastClr="FFFFFF"/>
+                  </a:solidFill>
+                  <a:effectLst/>
+                  <a:uLnTx/>
+                  <a:uFillTx/>
+                  <a:latin typeface="Lucida Sans Unicode"/>
+                  <a:ea typeface="+mn-ea"/>
+                  <a:cs typeface="+mn-cs"/>
+                </a:endParaRPr>
+              </a:p>
+            </p:txBody>
+          </p:sp>
+          <p:pic>
+            <p:nvPicPr>
+              <p:cNvPr id="27" name="Picture 26"/>
+              <p:cNvPicPr>
+                <a:picLocks noChangeAspect="1"/>
+              </p:cNvPicPr>
+              <p:nvPr/>
+            </p:nvPicPr>
+            <p:blipFill>
+              <a:blip r:embed="rId4">
+                <a:alphaModFix amt="30000"/>
+              </a:blip>
+              <a:stretch>
+                <a:fillRect/>
+              </a:stretch>
+            </p:blipFill>
+            <p:spPr>
+              <a:xfrm>
+                <a:off x="4738264" y="1971848"/>
+                <a:ext cx="875136" cy="493814"/>
+              </a:xfrm>
+              <a:prstGeom prst="rect">
+                <a:avLst/>
+              </a:prstGeom>
+            </p:spPr>
+          </p:pic>
+          <p:sp>
+            <p:nvSpPr>
+              <p:cNvPr id="28" name="Shape 165"/>
+              <p:cNvSpPr txBox="1"/>
+              <p:nvPr/>
+            </p:nvSpPr>
+            <p:spPr>
+              <a:xfrm rot="-1650">
+                <a:off x="4842725" y="1959299"/>
+                <a:ext cx="625200" cy="333600"/>
+              </a:xfrm>
+              <a:prstGeom prst="rect">
+                <a:avLst/>
+              </a:prstGeom>
+              <a:noFill/>
+              <a:ln>
+                <a:noFill/>
+              </a:ln>
+            </p:spPr>
+            <p:txBody>
+              <a:bodyPr lIns="91425" tIns="91425" rIns="91425" bIns="91425" anchor="t" anchorCtr="0">
+                <a:noAutofit/>
+              </a:bodyPr>
+              <a:lstStyle/>
+              <a:p>
+                <a:pPr lvl="0" rtl="0">
+                  <a:spcBef>
+                    <a:spcPts val="0"/>
+                  </a:spcBef>
+                  <a:buNone/>
+                </a:pPr>
+                <a:r>
+                  <a:rPr lang="en" sz="1200" b="1">
+                    <a:solidFill>
+                      <a:srgbClr val="351C75"/>
+                    </a:solidFill>
+                  </a:rPr>
+                  <a:t>VMM</a:t>
+                </a:r>
+              </a:p>
+            </p:txBody>
+          </p:sp>
+          <p:sp>
+            <p:nvSpPr>
+              <p:cNvPr id="29" name="Shape 167"/>
+              <p:cNvSpPr txBox="1"/>
+              <p:nvPr/>
+            </p:nvSpPr>
+            <p:spPr>
+              <a:xfrm rot="-2329">
+                <a:off x="5236399" y="2373072"/>
+                <a:ext cx="885600" cy="523500"/>
+              </a:xfrm>
+              <a:prstGeom prst="rect">
+                <a:avLst/>
+              </a:prstGeom>
+              <a:noFill/>
+              <a:ln>
+                <a:noFill/>
+              </a:ln>
+            </p:spPr>
+            <p:txBody>
+              <a:bodyPr lIns="91425" tIns="91425" rIns="91425" bIns="91425" anchor="t" anchorCtr="0">
+                <a:noAutofit/>
+              </a:bodyPr>
+              <a:lstStyle/>
+              <a:p>
+                <a:pPr lvl="0" rtl="0">
+                  <a:spcBef>
+                    <a:spcPts val="0"/>
+                  </a:spcBef>
+                  <a:buNone/>
+                </a:pPr>
+                <a:r>
+                  <a:rPr lang="en" sz="1200" b="1">
+                    <a:solidFill>
+                      <a:srgbClr val="351C75"/>
+                    </a:solidFill>
+                  </a:rPr>
+                  <a:t>Physical Machine</a:t>
+                </a:r>
+              </a:p>
+            </p:txBody>
+          </p:sp>
+        </p:grpSp>
+        <p:pic>
+          <p:nvPicPr>
+            <p:cNvPr id="25" name="Picture 24"/>
+            <p:cNvPicPr>
+              <a:picLocks noChangeAspect="1"/>
+            </p:cNvPicPr>
+            <p:nvPr/>
+          </p:nvPicPr>
+          <p:blipFill>
+            <a:blip r:embed="rId5">
+              <a:alphaModFix amt="30000"/>
+            </a:blip>
+            <a:stretch>
+              <a:fillRect/>
+            </a:stretch>
+          </p:blipFill>
+          <p:spPr>
+            <a:xfrm>
+              <a:off x="4230074" y="2360072"/>
+              <a:ext cx="380054" cy="453954"/>
+            </a:xfrm>
+            <a:prstGeom prst="rect">
+              <a:avLst/>
+            </a:prstGeom>
+          </p:spPr>
+        </p:pic>
+      </p:grpSp>
+      <p:sp>
+        <p:nvSpPr>
+          <p:cNvPr id="1221" name="Shape 1221"/>
+          <p:cNvSpPr txBox="1"/>
+          <p:nvPr/>
+        </p:nvSpPr>
+        <p:spPr>
+          <a:xfrm rot="-2332">
+            <a:off x="1468511" y="1243554"/>
+            <a:ext cx="442200" cy="333600"/>
+          </a:xfrm>
+          <a:prstGeom prst="rect">
+            <a:avLst/>
+          </a:prstGeom>
+          <a:noFill/>
+          <a:ln>
+            <a:noFill/>
+          </a:ln>
+        </p:spPr>
+        <p:txBody>
+          <a:bodyPr lIns="91425" tIns="91425" rIns="91425" bIns="91425" anchor="t" anchorCtr="0">
+            <a:noAutofit/>
+          </a:bodyPr>
+          <a:lstStyle/>
+          <a:p>
+            <a:pPr lvl="0" rtl="0">
+              <a:spcBef>
+                <a:spcPts val="0"/>
+              </a:spcBef>
+              <a:buNone/>
+            </a:pPr>
+            <a:r>
+              <a:rPr lang="en" sz="1200" b="1">
+                <a:solidFill>
+                  <a:srgbClr val="351C75"/>
+                </a:solidFill>
+              </a:rPr>
+              <a:t>DS</a:t>
+            </a:r>
+          </a:p>
+        </p:txBody>
+      </p:sp>
+      <p:sp>
+        <p:nvSpPr>
+          <p:cNvPr id="1223" name="Shape 1223"/>
+          <p:cNvSpPr txBox="1"/>
+          <p:nvPr/>
+        </p:nvSpPr>
+        <p:spPr>
+          <a:xfrm rot="-3033">
+            <a:off x="3213156" y="162586"/>
+            <a:ext cx="680100" cy="333600"/>
+          </a:xfrm>
+          <a:prstGeom prst="rect">
+            <a:avLst/>
+          </a:prstGeom>
+          <a:noFill/>
+          <a:ln>
+            <a:noFill/>
+          </a:ln>
+        </p:spPr>
+        <p:txBody>
+          <a:bodyPr lIns="91425" tIns="91425" rIns="91425" bIns="91425" anchor="t" anchorCtr="0">
+            <a:noAutofit/>
+          </a:bodyPr>
+          <a:lstStyle/>
+          <a:p>
+            <a:pPr lvl="0" rtl="0">
+              <a:spcBef>
+                <a:spcPts val="0"/>
+              </a:spcBef>
+              <a:buNone/>
+            </a:pPr>
+            <a:r>
+              <a:rPr lang="en" sz="1200" b="1">
+                <a:solidFill>
+                  <a:srgbClr val="351C75"/>
+                </a:solidFill>
+              </a:rPr>
+              <a:t>SLAM</a:t>
+            </a:r>
+          </a:p>
+        </p:txBody>
+      </p:sp>
+      <p:sp>
+        <p:nvSpPr>
+          <p:cNvPr id="1224" name="Shape 1224"/>
+          <p:cNvSpPr txBox="1"/>
+          <p:nvPr/>
+        </p:nvSpPr>
+        <p:spPr>
+          <a:xfrm rot="-2329">
+            <a:off x="5236399" y="2373072"/>
+            <a:ext cx="885600" cy="523500"/>
+          </a:xfrm>
+          <a:prstGeom prst="rect">
+            <a:avLst/>
+          </a:prstGeom>
+          <a:noFill/>
+          <a:ln>
+            <a:noFill/>
+          </a:ln>
+        </p:spPr>
+        <p:txBody>
+          <a:bodyPr lIns="91425" tIns="91425" rIns="91425" bIns="91425" anchor="t" anchorCtr="0">
+            <a:noAutofit/>
+          </a:bodyPr>
+          <a:lstStyle/>
+          <a:p>
+            <a:pPr lvl="0" rtl="0">
+              <a:spcBef>
+                <a:spcPts val="0"/>
+              </a:spcBef>
+              <a:buNone/>
+            </a:pPr>
+            <a:r>
+              <a:rPr lang="en" sz="1200" b="1">
+                <a:solidFill>
+                  <a:srgbClr val="351C75"/>
+                </a:solidFill>
+              </a:rPr>
+              <a:t>Physical Machine</a:t>
+            </a:r>
+          </a:p>
+        </p:txBody>
+      </p:sp>
+      <p:pic>
+        <p:nvPicPr>
+          <p:cNvPr id="1225" name="Shape 1225" descr="Untitled.png"/>
+          <p:cNvPicPr preferRelativeResize="0"/>
+          <p:nvPr/>
+        </p:nvPicPr>
+        <p:blipFill>
+          <a:blip r:embed="rId6">
+            <a:alphaModFix/>
+          </a:blip>
+          <a:stretch>
+            <a:fillRect/>
+          </a:stretch>
+        </p:blipFill>
+        <p:spPr>
+          <a:xfrm>
+            <a:off x="925600" y="4075700"/>
+            <a:ext cx="245601" cy="602400"/>
+          </a:xfrm>
+          <a:prstGeom prst="rect">
+            <a:avLst/>
+          </a:prstGeom>
+          <a:noFill/>
+          <a:ln>
+            <a:noFill/>
+          </a:ln>
+        </p:spPr>
+      </p:pic>
+      <p:sp>
+        <p:nvSpPr>
+          <p:cNvPr id="1226" name="Shape 1226"/>
+          <p:cNvSpPr txBox="1"/>
+          <p:nvPr/>
+        </p:nvSpPr>
+        <p:spPr>
+          <a:xfrm rot="-2630">
+            <a:off x="771253" y="4621351"/>
+            <a:ext cx="784200" cy="333600"/>
+          </a:xfrm>
+          <a:prstGeom prst="rect">
+            <a:avLst/>
+          </a:prstGeom>
+          <a:noFill/>
+          <a:ln>
+            <a:noFill/>
+          </a:ln>
+        </p:spPr>
+        <p:txBody>
+          <a:bodyPr lIns="91425" tIns="91425" rIns="91425" bIns="91425" anchor="t" anchorCtr="0">
+            <a:noAutofit/>
+          </a:bodyPr>
+          <a:lstStyle/>
+          <a:p>
+            <a:pPr lvl="0" rtl="0">
+              <a:spcBef>
+                <a:spcPts val="0"/>
+              </a:spcBef>
+              <a:buNone/>
+            </a:pPr>
+            <a:r>
+              <a:rPr lang="en" sz="1200" b="1">
+                <a:solidFill>
+                  <a:srgbClr val="351C75"/>
+                </a:solidFill>
+              </a:rPr>
+              <a:t>Client</a:t>
+            </a:r>
+          </a:p>
+        </p:txBody>
+      </p:sp>
+      <p:pic>
+        <p:nvPicPr>
+          <p:cNvPr id="20" name="Picture 19"/>
+          <p:cNvPicPr>
+            <a:picLocks noChangeAspect="1"/>
+          </p:cNvPicPr>
+          <p:nvPr/>
+        </p:nvPicPr>
+        <p:blipFill>
+          <a:blip r:embed="rId7">
+            <a:alphaModFix amt="30000"/>
+          </a:blip>
+          <a:stretch>
+            <a:fillRect/>
+          </a:stretch>
+        </p:blipFill>
+        <p:spPr>
+          <a:xfrm>
+            <a:off x="1335856" y="1502300"/>
+            <a:ext cx="375208" cy="526889"/>
+          </a:xfrm>
+          <a:prstGeom prst="rect">
+            <a:avLst/>
+          </a:prstGeom>
+          <a:ln>
+            <a:noFill/>
+          </a:ln>
+          <a:effectLst>
+            <a:outerShdw blurRad="292100" dist="139700" dir="2700000" algn="tl" rotWithShape="0">
+              <a:srgbClr val="333333">
+                <a:alpha val="65000"/>
+              </a:srgbClr>
+            </a:outerShdw>
+          </a:effectLst>
+        </p:spPr>
+      </p:pic>
+      <p:pic>
+        <p:nvPicPr>
+          <p:cNvPr id="22" name="Picture 21" descr="service-_level-agreement.png"/>
+          <p:cNvPicPr>
+            <a:picLocks noChangeAspect="1"/>
+          </p:cNvPicPr>
+          <p:nvPr/>
+        </p:nvPicPr>
+        <p:blipFill rotWithShape="1">
+          <a:blip r:embed="rId8">
+            <a:alphaModFix amt="30000"/>
+            <a:extLst>
+              <a:ext uri="{28A0092B-C50C-407E-A947-70E740481C1C}">
+                <a14:useLocalDpi xmlns:a14="http://schemas.microsoft.com/office/drawing/2010/main" val="0"/>
+              </a:ext>
+            </a:extLst>
+          </a:blip>
+          <a:srcRect l="24058" t="14272" r="19175" b="16715"/>
+          <a:stretch/>
+        </p:blipFill>
+        <p:spPr>
+          <a:xfrm>
+            <a:off x="3325523" y="413792"/>
+            <a:ext cx="411772" cy="500608"/>
+          </a:xfrm>
+          <a:prstGeom prst="rect">
+            <a:avLst/>
+          </a:prstGeom>
+        </p:spPr>
+      </p:pic>
+      <p:pic>
+        <p:nvPicPr>
+          <p:cNvPr id="2" name="Picture 1"/>
+          <p:cNvPicPr>
+            <a:picLocks noChangeAspect="1"/>
+          </p:cNvPicPr>
+          <p:nvPr/>
+        </p:nvPicPr>
+        <p:blipFill rotWithShape="1">
+          <a:blip r:embed="rId9"/>
+          <a:srcRect l="35334" t="11001" r="32333" b="10786"/>
+          <a:stretch/>
+        </p:blipFill>
+        <p:spPr>
+          <a:xfrm>
+            <a:off x="5236221" y="3907040"/>
+            <a:ext cx="381000" cy="921625"/>
+          </a:xfrm>
+          <a:prstGeom prst="rect">
+            <a:avLst/>
+          </a:prstGeom>
+        </p:spPr>
+      </p:pic>
+      <p:sp>
+        <p:nvSpPr>
+          <p:cNvPr id="30" name="Shape 1226"/>
+          <p:cNvSpPr txBox="1"/>
+          <p:nvPr/>
+        </p:nvSpPr>
+        <p:spPr>
+          <a:xfrm rot="21597370">
+            <a:off x="5112912" y="4738500"/>
+            <a:ext cx="784200" cy="333600"/>
+          </a:xfrm>
+          <a:prstGeom prst="rect">
+            <a:avLst/>
+          </a:prstGeom>
+          <a:noFill/>
+          <a:ln>
+            <a:noFill/>
+          </a:ln>
+        </p:spPr>
+        <p:txBody>
+          <a:bodyPr lIns="91425" tIns="91425" rIns="91425" bIns="91425" anchor="t" anchorCtr="0">
+            <a:noAutofit/>
+          </a:bodyPr>
+          <a:lstStyle/>
+          <a:p>
+            <a:pPr lvl="0" rtl="0">
+              <a:spcBef>
+                <a:spcPts val="0"/>
+              </a:spcBef>
+              <a:buNone/>
+            </a:pPr>
+            <a:r>
+              <a:rPr lang="en-US" sz="1200" b="1" dirty="0" smtClean="0">
+                <a:solidFill>
+                  <a:srgbClr val="351C75"/>
+                </a:solidFill>
+              </a:rPr>
+              <a:t>AC/AS</a:t>
+            </a:r>
+            <a:endParaRPr lang="en" sz="1200" b="1" dirty="0">
+              <a:solidFill>
+                <a:srgbClr val="351C75"/>
+              </a:solidFill>
+            </a:endParaRPr>
+          </a:p>
+        </p:txBody>
+      </p:sp>
+      <p:sp>
+        <p:nvSpPr>
+          <p:cNvPr id="19" name="Shape 1228"/>
+          <p:cNvSpPr/>
+          <p:nvPr/>
+        </p:nvSpPr>
+        <p:spPr>
+          <a:xfrm>
+            <a:off x="107511" y="3404950"/>
+            <a:ext cx="1360886" cy="437700"/>
+          </a:xfrm>
+          <a:prstGeom prst="wedgeRectCallout">
+            <a:avLst>
+              <a:gd name="adj1" fmla="val 11974"/>
+              <a:gd name="adj2" fmla="val 107100"/>
+            </a:avLst>
+          </a:prstGeom>
+          <a:solidFill>
+            <a:srgbClr val="990000"/>
+          </a:solidFill>
+          <a:ln w="9525" cap="flat" cmpd="sng">
+            <a:solidFill>
+              <a:srgbClr val="660000"/>
+            </a:solidFill>
+            <a:prstDash val="solid"/>
+            <a:round/>
+            <a:headEnd type="none" w="med" len="med"/>
+            <a:tailEnd type="none" w="med" len="med"/>
+          </a:ln>
+        </p:spPr>
+        <p:txBody>
+          <a:bodyPr lIns="91425" tIns="91425" rIns="91425" bIns="91425" anchor="ctr" anchorCtr="0">
+            <a:noAutofit/>
+          </a:bodyPr>
+          <a:lstStyle/>
+          <a:p>
+            <a:pPr marL="0" marR="0" lvl="0" indent="0" algn="ctr" rtl="0">
+              <a:lnSpc>
+                <a:spcPct val="100000"/>
+              </a:lnSpc>
+              <a:spcBef>
+                <a:spcPts val="0"/>
+              </a:spcBef>
+              <a:spcAft>
+                <a:spcPts val="0"/>
+              </a:spcAft>
+              <a:buNone/>
+            </a:pPr>
+            <a:r>
+              <a:rPr lang="en-US" sz="1200" dirty="0" smtClean="0">
+                <a:solidFill>
+                  <a:schemeClr val="lt1"/>
+                </a:solidFill>
+              </a:rPr>
+              <a:t>Listening for D2D devices</a:t>
+            </a:r>
+            <a:r>
+              <a:rPr lang="is-IS" sz="1200" dirty="0" smtClean="0">
+                <a:solidFill>
+                  <a:schemeClr val="lt1"/>
+                </a:solidFill>
+              </a:rPr>
+              <a:t>…</a:t>
+            </a:r>
+            <a:endParaRPr lang="en" sz="1200" dirty="0">
+              <a:solidFill>
+                <a:schemeClr val="lt1"/>
+              </a:solidFill>
+            </a:endParaRPr>
+          </a:p>
+        </p:txBody>
+      </p:sp>
+    </p:spTree>
+    <p:extLst>
+      <p:ext uri="{BB962C8B-B14F-4D97-AF65-F5344CB8AC3E}">
+        <p14:creationId xmlns:p14="http://schemas.microsoft.com/office/powerpoint/2010/main" val="3236973740"/>
+      </p:ext>
+    </p:extLst>
+  </p:cSld>
+  <p:clrMapOvr>
+    <a:masterClrMapping/>
+  </p:clrMapOvr>
+</p:sld>
+</file>
+
+<file path=ppt/slides/slide61.xml><?xml version="1.0" encoding="utf-8"?>
+<p:sld xmlns:a="http://schemas.openxmlformats.org/drawingml/2006/main" xmlns:r="http://schemas.openxmlformats.org/officeDocument/2006/relationships" xmlns:p="http://schemas.openxmlformats.org/presentationml/2006/main">
+  <p:cSld>
+    <p:spTree>
+      <p:nvGrpSpPr>
+        <p:cNvPr id="1" name="Shape 1216"/>
+        <p:cNvGrpSpPr/>
+        <p:nvPr/>
+      </p:nvGrpSpPr>
+      <p:grpSpPr>
+        <a:xfrm>
+          <a:off x="0" y="0"/>
+          <a:ext cx="0" cy="0"/>
+          <a:chOff x="0" y="0"/>
+          <a:chExt cx="0" cy="0"/>
+        </a:xfrm>
+      </p:grpSpPr>
+      <p:pic>
+        <p:nvPicPr>
+          <p:cNvPr id="3" name="Picture 2"/>
+          <p:cNvPicPr>
+            <a:picLocks noChangeAspect="1"/>
+          </p:cNvPicPr>
+          <p:nvPr/>
+        </p:nvPicPr>
+        <p:blipFill>
+          <a:blip r:embed="rId3"/>
+          <a:stretch>
+            <a:fillRect/>
+          </a:stretch>
+        </p:blipFill>
+        <p:spPr>
+          <a:xfrm>
+            <a:off x="2761918" y="3036621"/>
+            <a:ext cx="902179" cy="902179"/>
+          </a:xfrm>
+          <a:prstGeom prst="rect">
+            <a:avLst/>
+          </a:prstGeom>
+        </p:spPr>
+      </p:pic>
+      <p:grpSp>
+        <p:nvGrpSpPr>
+          <p:cNvPr id="23" name="Group 22"/>
+          <p:cNvGrpSpPr/>
+          <p:nvPr/>
+        </p:nvGrpSpPr>
+        <p:grpSpPr>
+          <a:xfrm>
+            <a:off x="3834904" y="1753293"/>
+            <a:ext cx="2287095" cy="1345507"/>
+            <a:chOff x="3834904" y="1753293"/>
+            <a:chExt cx="2287095" cy="1345507"/>
+          </a:xfrm>
+        </p:grpSpPr>
+        <p:grpSp>
+          <p:nvGrpSpPr>
+            <p:cNvPr id="24" name="Group 23"/>
+            <p:cNvGrpSpPr/>
+            <p:nvPr/>
+          </p:nvGrpSpPr>
+          <p:grpSpPr>
+            <a:xfrm>
+              <a:off x="3834904" y="1753293"/>
+              <a:ext cx="2287095" cy="1345507"/>
+              <a:chOff x="3834904" y="1753293"/>
+              <a:chExt cx="2287095" cy="1345507"/>
+            </a:xfrm>
+          </p:grpSpPr>
+          <p:sp>
+            <p:nvSpPr>
+              <p:cNvPr id="26" name="Cloud 25"/>
+              <p:cNvSpPr/>
+              <p:nvPr/>
+            </p:nvSpPr>
+            <p:spPr>
+              <a:xfrm>
+                <a:off x="3834904" y="1753293"/>
+                <a:ext cx="2015480" cy="1345507"/>
+              </a:xfrm>
+              <a:prstGeom prst="cloud">
+                <a:avLst/>
+              </a:prstGeom>
+              <a:gradFill flip="none" rotWithShape="1">
+                <a:gsLst>
+                  <a:gs pos="0">
+                    <a:srgbClr val="D16349">
+                      <a:shade val="15000"/>
+                      <a:satMod val="180000"/>
+                      <a:alpha val="73000"/>
+                    </a:srgbClr>
+                  </a:gs>
+                  <a:gs pos="50000">
+                    <a:srgbClr val="D16349">
+                      <a:shade val="45000"/>
+                      <a:satMod val="170000"/>
+                      <a:alpha val="73000"/>
+                    </a:srgbClr>
+                  </a:gs>
+                  <a:gs pos="70000">
+                    <a:srgbClr val="D16349">
+                      <a:tint val="99000"/>
+                      <a:shade val="65000"/>
+                      <a:satMod val="155000"/>
+                      <a:alpha val="73000"/>
+                    </a:srgbClr>
+                  </a:gs>
+                  <a:gs pos="100000">
+                    <a:srgbClr val="D16349">
+                      <a:tint val="95500"/>
+                      <a:shade val="100000"/>
+                      <a:satMod val="155000"/>
+                      <a:alpha val="73000"/>
+                    </a:srgbClr>
+                  </a:gs>
+                </a:gsLst>
+                <a:lin ang="16200000" scaled="0"/>
+                <a:tileRect/>
+              </a:gradFill>
+              <a:ln w="9525" cap="flat" cmpd="sng" algn="ctr">
+                <a:solidFill>
+                  <a:srgbClr val="D16349"/>
+                </a:solidFill>
+                <a:prstDash val="solid"/>
+              </a:ln>
+              <a:effectLst>
+                <a:outerShdw blurRad="50800" dist="38100" dir="5400000" rotWithShape="0">
+                  <a:srgbClr val="000000">
+                    <a:alpha val="35000"/>
+                  </a:srgbClr>
+                </a:outerShdw>
+              </a:effectLst>
+            </p:spPr>
+            <p:txBody>
+              <a:bodyPr rtlCol="0" anchor="ctr"/>
+              <a:lstStyle/>
+              <a:p>
+                <a:pPr marL="0" marR="0" lvl="0" indent="0" algn="ctr" defTabSz="914400" eaLnBrk="1" fontAlgn="auto" latinLnBrk="0" hangingPunct="1">
+                  <a:lnSpc>
+                    <a:spcPct val="100000"/>
+                  </a:lnSpc>
+                  <a:spcBef>
+                    <a:spcPts val="0"/>
+                  </a:spcBef>
+                  <a:spcAft>
+                    <a:spcPts val="0"/>
+                  </a:spcAft>
+                  <a:buClrTx/>
+                  <a:buSzTx/>
+                  <a:buFontTx/>
+                  <a:buNone/>
+                  <a:tabLst/>
+                  <a:defRPr/>
+                </a:pPr>
+                <a:endParaRPr kumimoji="0" lang="en-US" sz="1800" b="0" i="0" u="none" strike="noStrike" kern="0" cap="none" spc="0" normalizeH="0" baseline="0" noProof="0">
+                  <a:ln>
+                    <a:noFill/>
+                  </a:ln>
+                  <a:solidFill>
+                    <a:sysClr val="window" lastClr="FFFFFF"/>
+                  </a:solidFill>
+                  <a:effectLst/>
+                  <a:uLnTx/>
+                  <a:uFillTx/>
+                  <a:latin typeface="Lucida Sans Unicode"/>
+                  <a:ea typeface="+mn-ea"/>
+                  <a:cs typeface="+mn-cs"/>
+                </a:endParaRPr>
+              </a:p>
+            </p:txBody>
+          </p:sp>
+          <p:pic>
+            <p:nvPicPr>
+              <p:cNvPr id="27" name="Picture 26"/>
+              <p:cNvPicPr>
+                <a:picLocks noChangeAspect="1"/>
+              </p:cNvPicPr>
+              <p:nvPr/>
+            </p:nvPicPr>
+            <p:blipFill>
+              <a:blip r:embed="rId4">
+                <a:alphaModFix amt="30000"/>
+              </a:blip>
+              <a:stretch>
+                <a:fillRect/>
+              </a:stretch>
+            </p:blipFill>
+            <p:spPr>
+              <a:xfrm>
+                <a:off x="4738264" y="1971848"/>
+                <a:ext cx="875136" cy="493814"/>
+              </a:xfrm>
+              <a:prstGeom prst="rect">
+                <a:avLst/>
+              </a:prstGeom>
+            </p:spPr>
+          </p:pic>
+          <p:sp>
+            <p:nvSpPr>
+              <p:cNvPr id="28" name="Shape 165"/>
+              <p:cNvSpPr txBox="1"/>
+              <p:nvPr/>
+            </p:nvSpPr>
+            <p:spPr>
+              <a:xfrm rot="-1650">
+                <a:off x="4842725" y="1959299"/>
+                <a:ext cx="625200" cy="333600"/>
+              </a:xfrm>
+              <a:prstGeom prst="rect">
+                <a:avLst/>
+              </a:prstGeom>
+              <a:noFill/>
+              <a:ln>
+                <a:noFill/>
+              </a:ln>
+            </p:spPr>
+            <p:txBody>
+              <a:bodyPr lIns="91425" tIns="91425" rIns="91425" bIns="91425" anchor="t" anchorCtr="0">
+                <a:noAutofit/>
+              </a:bodyPr>
+              <a:lstStyle/>
+              <a:p>
+                <a:pPr lvl="0" rtl="0">
+                  <a:spcBef>
+                    <a:spcPts val="0"/>
+                  </a:spcBef>
+                  <a:buNone/>
+                </a:pPr>
+                <a:r>
+                  <a:rPr lang="en" sz="1200" b="1">
+                    <a:solidFill>
+                      <a:srgbClr val="351C75"/>
+                    </a:solidFill>
+                  </a:rPr>
+                  <a:t>VMM</a:t>
+                </a:r>
+              </a:p>
+            </p:txBody>
+          </p:sp>
+          <p:sp>
+            <p:nvSpPr>
+              <p:cNvPr id="29" name="Shape 167"/>
+              <p:cNvSpPr txBox="1"/>
+              <p:nvPr/>
+            </p:nvSpPr>
+            <p:spPr>
+              <a:xfrm rot="-2329">
+                <a:off x="5236399" y="2373072"/>
+                <a:ext cx="885600" cy="523500"/>
+              </a:xfrm>
+              <a:prstGeom prst="rect">
+                <a:avLst/>
+              </a:prstGeom>
+              <a:noFill/>
+              <a:ln>
+                <a:noFill/>
+              </a:ln>
+            </p:spPr>
+            <p:txBody>
+              <a:bodyPr lIns="91425" tIns="91425" rIns="91425" bIns="91425" anchor="t" anchorCtr="0">
+                <a:noAutofit/>
+              </a:bodyPr>
+              <a:lstStyle/>
+              <a:p>
+                <a:pPr lvl="0" rtl="0">
+                  <a:spcBef>
+                    <a:spcPts val="0"/>
+                  </a:spcBef>
+                  <a:buNone/>
+                </a:pPr>
+                <a:r>
+                  <a:rPr lang="en" sz="1200" b="1">
+                    <a:solidFill>
+                      <a:srgbClr val="351C75"/>
+                    </a:solidFill>
+                  </a:rPr>
+                  <a:t>Physical Machine</a:t>
+                </a:r>
+              </a:p>
+            </p:txBody>
+          </p:sp>
+        </p:grpSp>
+        <p:pic>
+          <p:nvPicPr>
+            <p:cNvPr id="25" name="Picture 24"/>
+            <p:cNvPicPr>
+              <a:picLocks noChangeAspect="1"/>
+            </p:cNvPicPr>
+            <p:nvPr/>
+          </p:nvPicPr>
+          <p:blipFill>
+            <a:blip r:embed="rId5">
+              <a:alphaModFix amt="30000"/>
+            </a:blip>
+            <a:stretch>
+              <a:fillRect/>
+            </a:stretch>
+          </p:blipFill>
+          <p:spPr>
+            <a:xfrm>
+              <a:off x="4230074" y="2360072"/>
+              <a:ext cx="380054" cy="453954"/>
+            </a:xfrm>
+            <a:prstGeom prst="rect">
+              <a:avLst/>
+            </a:prstGeom>
+          </p:spPr>
+        </p:pic>
+      </p:grpSp>
+      <p:sp>
+        <p:nvSpPr>
+          <p:cNvPr id="1221" name="Shape 1221"/>
+          <p:cNvSpPr txBox="1"/>
+          <p:nvPr/>
+        </p:nvSpPr>
+        <p:spPr>
+          <a:xfrm rot="-2332">
+            <a:off x="1468511" y="1243554"/>
+            <a:ext cx="442200" cy="333600"/>
+          </a:xfrm>
+          <a:prstGeom prst="rect">
+            <a:avLst/>
+          </a:prstGeom>
+          <a:noFill/>
+          <a:ln>
+            <a:noFill/>
+          </a:ln>
+        </p:spPr>
+        <p:txBody>
+          <a:bodyPr lIns="91425" tIns="91425" rIns="91425" bIns="91425" anchor="t" anchorCtr="0">
+            <a:noAutofit/>
+          </a:bodyPr>
+          <a:lstStyle/>
+          <a:p>
+            <a:pPr lvl="0" rtl="0">
+              <a:spcBef>
+                <a:spcPts val="0"/>
+              </a:spcBef>
+              <a:buNone/>
+            </a:pPr>
+            <a:r>
+              <a:rPr lang="en" sz="1200" b="1">
+                <a:solidFill>
+                  <a:srgbClr val="351C75"/>
+                </a:solidFill>
+              </a:rPr>
+              <a:t>DS</a:t>
+            </a:r>
+          </a:p>
+        </p:txBody>
+      </p:sp>
+      <p:sp>
+        <p:nvSpPr>
+          <p:cNvPr id="1223" name="Shape 1223"/>
+          <p:cNvSpPr txBox="1"/>
+          <p:nvPr/>
+        </p:nvSpPr>
+        <p:spPr>
+          <a:xfrm rot="-3033">
+            <a:off x="3213156" y="162586"/>
+            <a:ext cx="680100" cy="333600"/>
+          </a:xfrm>
+          <a:prstGeom prst="rect">
+            <a:avLst/>
+          </a:prstGeom>
+          <a:noFill/>
+          <a:ln>
+            <a:noFill/>
+          </a:ln>
+        </p:spPr>
+        <p:txBody>
+          <a:bodyPr lIns="91425" tIns="91425" rIns="91425" bIns="91425" anchor="t" anchorCtr="0">
+            <a:noAutofit/>
+          </a:bodyPr>
+          <a:lstStyle/>
+          <a:p>
+            <a:pPr lvl="0" rtl="0">
+              <a:spcBef>
+                <a:spcPts val="0"/>
+              </a:spcBef>
+              <a:buNone/>
+            </a:pPr>
+            <a:r>
+              <a:rPr lang="en" sz="1200" b="1">
+                <a:solidFill>
+                  <a:srgbClr val="351C75"/>
+                </a:solidFill>
+              </a:rPr>
+              <a:t>SLAM</a:t>
+            </a:r>
+          </a:p>
+        </p:txBody>
+      </p:sp>
+      <p:sp>
+        <p:nvSpPr>
+          <p:cNvPr id="1224" name="Shape 1224"/>
+          <p:cNvSpPr txBox="1"/>
+          <p:nvPr/>
+        </p:nvSpPr>
+        <p:spPr>
+          <a:xfrm rot="-2329">
+            <a:off x="5236399" y="2373072"/>
+            <a:ext cx="885600" cy="523500"/>
+          </a:xfrm>
+          <a:prstGeom prst="rect">
+            <a:avLst/>
+          </a:prstGeom>
+          <a:noFill/>
+          <a:ln>
+            <a:noFill/>
+          </a:ln>
+        </p:spPr>
+        <p:txBody>
+          <a:bodyPr lIns="91425" tIns="91425" rIns="91425" bIns="91425" anchor="t" anchorCtr="0">
+            <a:noAutofit/>
+          </a:bodyPr>
+          <a:lstStyle/>
+          <a:p>
+            <a:pPr lvl="0" rtl="0">
+              <a:spcBef>
+                <a:spcPts val="0"/>
+              </a:spcBef>
+              <a:buNone/>
+            </a:pPr>
+            <a:r>
+              <a:rPr lang="en" sz="1200" b="1">
+                <a:solidFill>
+                  <a:srgbClr val="351C75"/>
+                </a:solidFill>
+              </a:rPr>
+              <a:t>Physical Machine</a:t>
+            </a:r>
+          </a:p>
+        </p:txBody>
+      </p:sp>
+      <p:pic>
+        <p:nvPicPr>
+          <p:cNvPr id="1225" name="Shape 1225" descr="Untitled.png"/>
+          <p:cNvPicPr preferRelativeResize="0"/>
+          <p:nvPr/>
+        </p:nvPicPr>
+        <p:blipFill>
+          <a:blip r:embed="rId6">
+            <a:alphaModFix/>
+          </a:blip>
+          <a:stretch>
+            <a:fillRect/>
+          </a:stretch>
+        </p:blipFill>
+        <p:spPr>
+          <a:xfrm>
+            <a:off x="925600" y="4075700"/>
+            <a:ext cx="245601" cy="602400"/>
+          </a:xfrm>
+          <a:prstGeom prst="rect">
+            <a:avLst/>
+          </a:prstGeom>
+          <a:noFill/>
+          <a:ln>
+            <a:noFill/>
+          </a:ln>
+        </p:spPr>
+      </p:pic>
+      <p:sp>
+        <p:nvSpPr>
+          <p:cNvPr id="1226" name="Shape 1226"/>
+          <p:cNvSpPr txBox="1"/>
+          <p:nvPr/>
+        </p:nvSpPr>
+        <p:spPr>
+          <a:xfrm rot="-2630">
+            <a:off x="771253" y="4621351"/>
+            <a:ext cx="784200" cy="333600"/>
+          </a:xfrm>
+          <a:prstGeom prst="rect">
+            <a:avLst/>
+          </a:prstGeom>
+          <a:noFill/>
+          <a:ln>
+            <a:noFill/>
+          </a:ln>
+        </p:spPr>
+        <p:txBody>
+          <a:bodyPr lIns="91425" tIns="91425" rIns="91425" bIns="91425" anchor="t" anchorCtr="0">
+            <a:noAutofit/>
+          </a:bodyPr>
+          <a:lstStyle/>
+          <a:p>
+            <a:pPr lvl="0" rtl="0">
+              <a:spcBef>
+                <a:spcPts val="0"/>
+              </a:spcBef>
+              <a:buNone/>
+            </a:pPr>
+            <a:r>
+              <a:rPr lang="en" sz="1200" b="1">
+                <a:solidFill>
+                  <a:srgbClr val="351C75"/>
+                </a:solidFill>
+              </a:rPr>
+              <a:t>Client</a:t>
+            </a:r>
+          </a:p>
+        </p:txBody>
+      </p:sp>
+      <p:pic>
+        <p:nvPicPr>
+          <p:cNvPr id="20" name="Picture 19"/>
+          <p:cNvPicPr>
+            <a:picLocks noChangeAspect="1"/>
+          </p:cNvPicPr>
+          <p:nvPr/>
+        </p:nvPicPr>
+        <p:blipFill>
+          <a:blip r:embed="rId7">
+            <a:alphaModFix amt="30000"/>
+          </a:blip>
+          <a:stretch>
+            <a:fillRect/>
+          </a:stretch>
+        </p:blipFill>
+        <p:spPr>
+          <a:xfrm>
+            <a:off x="1335856" y="1502300"/>
+            <a:ext cx="375208" cy="526889"/>
+          </a:xfrm>
+          <a:prstGeom prst="rect">
+            <a:avLst/>
+          </a:prstGeom>
+          <a:ln>
+            <a:noFill/>
+          </a:ln>
+          <a:effectLst>
+            <a:outerShdw blurRad="292100" dist="139700" dir="2700000" algn="tl" rotWithShape="0">
+              <a:srgbClr val="333333">
+                <a:alpha val="65000"/>
+              </a:srgbClr>
+            </a:outerShdw>
+          </a:effectLst>
+        </p:spPr>
+      </p:pic>
+      <p:pic>
+        <p:nvPicPr>
+          <p:cNvPr id="22" name="Picture 21" descr="service-_level-agreement.png"/>
+          <p:cNvPicPr>
+            <a:picLocks noChangeAspect="1"/>
+          </p:cNvPicPr>
+          <p:nvPr/>
+        </p:nvPicPr>
+        <p:blipFill rotWithShape="1">
+          <a:blip r:embed="rId8">
+            <a:alphaModFix amt="30000"/>
+            <a:extLst>
+              <a:ext uri="{28A0092B-C50C-407E-A947-70E740481C1C}">
+                <a14:useLocalDpi xmlns:a14="http://schemas.microsoft.com/office/drawing/2010/main" val="0"/>
+              </a:ext>
+            </a:extLst>
+          </a:blip>
+          <a:srcRect l="24058" t="14272" r="19175" b="16715"/>
+          <a:stretch/>
+        </p:blipFill>
+        <p:spPr>
+          <a:xfrm>
+            <a:off x="3325523" y="413792"/>
+            <a:ext cx="411772" cy="500608"/>
+          </a:xfrm>
+          <a:prstGeom prst="rect">
+            <a:avLst/>
+          </a:prstGeom>
+        </p:spPr>
+      </p:pic>
+      <p:pic>
+        <p:nvPicPr>
+          <p:cNvPr id="2" name="Picture 1"/>
+          <p:cNvPicPr>
+            <a:picLocks noChangeAspect="1"/>
+          </p:cNvPicPr>
+          <p:nvPr/>
+        </p:nvPicPr>
+        <p:blipFill rotWithShape="1">
+          <a:blip r:embed="rId9"/>
+          <a:srcRect l="35334" t="11001" r="32333" b="10786"/>
+          <a:stretch/>
+        </p:blipFill>
+        <p:spPr>
+          <a:xfrm>
+            <a:off x="5236221" y="3907040"/>
+            <a:ext cx="381000" cy="921625"/>
+          </a:xfrm>
+          <a:prstGeom prst="rect">
+            <a:avLst/>
+          </a:prstGeom>
+        </p:spPr>
+      </p:pic>
+      <p:sp>
+        <p:nvSpPr>
+          <p:cNvPr id="30" name="Shape 1226"/>
+          <p:cNvSpPr txBox="1"/>
+          <p:nvPr/>
+        </p:nvSpPr>
+        <p:spPr>
+          <a:xfrm rot="21597370">
+            <a:off x="5112912" y="4738500"/>
+            <a:ext cx="784200" cy="333600"/>
+          </a:xfrm>
+          <a:prstGeom prst="rect">
+            <a:avLst/>
+          </a:prstGeom>
+          <a:noFill/>
+          <a:ln>
+            <a:noFill/>
+          </a:ln>
+        </p:spPr>
+        <p:txBody>
+          <a:bodyPr lIns="91425" tIns="91425" rIns="91425" bIns="91425" anchor="t" anchorCtr="0">
+            <a:noAutofit/>
+          </a:bodyPr>
+          <a:lstStyle/>
+          <a:p>
+            <a:pPr lvl="0" rtl="0">
+              <a:spcBef>
+                <a:spcPts val="0"/>
+              </a:spcBef>
+              <a:buNone/>
+            </a:pPr>
+            <a:r>
+              <a:rPr lang="en-US" sz="1200" b="1" dirty="0" smtClean="0">
+                <a:solidFill>
+                  <a:srgbClr val="351C75"/>
+                </a:solidFill>
+              </a:rPr>
+              <a:t>AC/AS</a:t>
+            </a:r>
+            <a:endParaRPr lang="en" sz="1200" b="1" dirty="0">
+              <a:solidFill>
+                <a:srgbClr val="351C75"/>
+              </a:solidFill>
+            </a:endParaRPr>
+          </a:p>
+        </p:txBody>
+      </p:sp>
+    </p:spTree>
+    <p:extLst>
+      <p:ext uri="{BB962C8B-B14F-4D97-AF65-F5344CB8AC3E}">
+        <p14:creationId xmlns:p14="http://schemas.microsoft.com/office/powerpoint/2010/main" val="3586491458"/>
+      </p:ext>
+    </p:extLst>
+  </p:cSld>
+  <p:clrMapOvr>
+    <a:masterClrMapping/>
+  </p:clrMapOvr>
 </p:sld>
 </file>
 

</xml_diff>